<commit_message>
updated logistic regression material
</commit_message>
<xml_diff>
--- a/Session4/Session4_Slides.pptx
+++ b/Session4/Session4_Slides.pptx
@@ -6,7 +6,7 @@
     <p:sldMasterId id="2147483648" r:id="rId2"/>
   </p:sldMasterIdLst>
   <p:notesMasterIdLst>
-    <p:notesMasterId r:id="rId47"/>
+    <p:notesMasterId r:id="rId48"/>
   </p:notesMasterIdLst>
   <p:sldIdLst>
     <p:sldId id="256" r:id="rId3"/>
@@ -16,43 +16,44 @@
     <p:sldId id="260" r:id="rId7"/>
     <p:sldId id="261" r:id="rId8"/>
     <p:sldId id="262" r:id="rId9"/>
-    <p:sldId id="263" r:id="rId10"/>
-    <p:sldId id="264" r:id="rId11"/>
-    <p:sldId id="265" r:id="rId12"/>
-    <p:sldId id="266" r:id="rId13"/>
-    <p:sldId id="267" r:id="rId14"/>
-    <p:sldId id="268" r:id="rId15"/>
-    <p:sldId id="269" r:id="rId16"/>
-    <p:sldId id="301" r:id="rId17"/>
-    <p:sldId id="271" r:id="rId18"/>
-    <p:sldId id="272" r:id="rId19"/>
-    <p:sldId id="302" r:id="rId20"/>
-    <p:sldId id="274" r:id="rId21"/>
-    <p:sldId id="275" r:id="rId22"/>
-    <p:sldId id="276" r:id="rId23"/>
-    <p:sldId id="277" r:id="rId24"/>
-    <p:sldId id="278" r:id="rId25"/>
-    <p:sldId id="279" r:id="rId26"/>
-    <p:sldId id="280" r:id="rId27"/>
-    <p:sldId id="281" r:id="rId28"/>
-    <p:sldId id="282" r:id="rId29"/>
-    <p:sldId id="283" r:id="rId30"/>
-    <p:sldId id="285" r:id="rId31"/>
-    <p:sldId id="286" r:id="rId32"/>
-    <p:sldId id="287" r:id="rId33"/>
-    <p:sldId id="288" r:id="rId34"/>
-    <p:sldId id="289" r:id="rId35"/>
-    <p:sldId id="290" r:id="rId36"/>
-    <p:sldId id="291" r:id="rId37"/>
-    <p:sldId id="292" r:id="rId38"/>
-    <p:sldId id="293" r:id="rId39"/>
-    <p:sldId id="294" r:id="rId40"/>
-    <p:sldId id="295" r:id="rId41"/>
-    <p:sldId id="296" r:id="rId42"/>
-    <p:sldId id="297" r:id="rId43"/>
-    <p:sldId id="298" r:id="rId44"/>
-    <p:sldId id="299" r:id="rId45"/>
-    <p:sldId id="300" r:id="rId46"/>
+    <p:sldId id="303" r:id="rId10"/>
+    <p:sldId id="263" r:id="rId11"/>
+    <p:sldId id="264" r:id="rId12"/>
+    <p:sldId id="265" r:id="rId13"/>
+    <p:sldId id="266" r:id="rId14"/>
+    <p:sldId id="267" r:id="rId15"/>
+    <p:sldId id="268" r:id="rId16"/>
+    <p:sldId id="269" r:id="rId17"/>
+    <p:sldId id="301" r:id="rId18"/>
+    <p:sldId id="271" r:id="rId19"/>
+    <p:sldId id="272" r:id="rId20"/>
+    <p:sldId id="302" r:id="rId21"/>
+    <p:sldId id="274" r:id="rId22"/>
+    <p:sldId id="275" r:id="rId23"/>
+    <p:sldId id="276" r:id="rId24"/>
+    <p:sldId id="277" r:id="rId25"/>
+    <p:sldId id="278" r:id="rId26"/>
+    <p:sldId id="279" r:id="rId27"/>
+    <p:sldId id="280" r:id="rId28"/>
+    <p:sldId id="281" r:id="rId29"/>
+    <p:sldId id="282" r:id="rId30"/>
+    <p:sldId id="283" r:id="rId31"/>
+    <p:sldId id="285" r:id="rId32"/>
+    <p:sldId id="286" r:id="rId33"/>
+    <p:sldId id="287" r:id="rId34"/>
+    <p:sldId id="288" r:id="rId35"/>
+    <p:sldId id="289" r:id="rId36"/>
+    <p:sldId id="290" r:id="rId37"/>
+    <p:sldId id="291" r:id="rId38"/>
+    <p:sldId id="292" r:id="rId39"/>
+    <p:sldId id="293" r:id="rId40"/>
+    <p:sldId id="294" r:id="rId41"/>
+    <p:sldId id="295" r:id="rId42"/>
+    <p:sldId id="296" r:id="rId43"/>
+    <p:sldId id="297" r:id="rId44"/>
+    <p:sldId id="298" r:id="rId45"/>
+    <p:sldId id="299" r:id="rId46"/>
+    <p:sldId id="300" r:id="rId47"/>
   </p:sldIdLst>
   <p:sldSz cx="13004800" cy="9753600"/>
   <p:notesSz cx="6858000" cy="9144000"/>
@@ -672,7 +673,7 @@
                 <a:effectLst/>
                 <a:latin typeface="Arial" panose="020B0604020202020204" pitchFamily="34" charset="0"/>
               </a:rPr>
-              <a:t>False positive rate:</a:t>
+              <a:t>False positive rate = (1 – specificity):</a:t>
             </a:r>
           </a:p>
           <a:p>
@@ -701,7 +702,7 @@
                 <a:effectLst/>
                 <a:latin typeface="Arial" panose="020B0604020202020204" pitchFamily="34" charset="0"/>
               </a:rPr>
-              <a:t>	-Out of all the true negatives, what proportion did fail to identify as such?</a:t>
+              <a:t>	-Out of all the true negatives, what proportion did we fail to identify as such?</a:t>
             </a:r>
             <a:endParaRPr lang="en-US" dirty="0"/>
           </a:p>
@@ -847,7 +848,7 @@
                 <a:effectLst/>
                 <a:latin typeface="Arial" panose="020B0604020202020204" pitchFamily="34" charset="0"/>
               </a:rPr>
-              <a:t>False positive rate:</a:t>
+              <a:t>False positive rate = (1 – specificity):</a:t>
             </a:r>
           </a:p>
           <a:p>
@@ -876,7 +877,7 @@
                 <a:effectLst/>
                 <a:latin typeface="Arial" panose="020B0604020202020204" pitchFamily="34" charset="0"/>
               </a:rPr>
-              <a:t>	-Out of all the true negatives, what proportion did fail to identify as such?</a:t>
+              <a:t>	-Out of all the true negatives, what proportion did we fail to identify as such?</a:t>
             </a:r>
             <a:endParaRPr lang="en-US" dirty="0"/>
           </a:p>
@@ -1022,7 +1023,7 @@
                 <a:effectLst/>
                 <a:latin typeface="Arial" panose="020B0604020202020204" pitchFamily="34" charset="0"/>
               </a:rPr>
-              <a:t>False positive rate:</a:t>
+              <a:t>False positive rate = (1 – specificity):</a:t>
             </a:r>
           </a:p>
           <a:p>
@@ -1051,7 +1052,7 @@
                 <a:effectLst/>
                 <a:latin typeface="Arial" panose="020B0604020202020204" pitchFamily="34" charset="0"/>
               </a:rPr>
-              <a:t>	-Out of all the true negatives, what proportion did fail to identify as such?</a:t>
+              <a:t>	-Out of all the true negatives, what proportion did we fail to identify as such?</a:t>
             </a:r>
             <a:endParaRPr lang="en-US" dirty="0"/>
           </a:p>
@@ -13964,7 +13965,7 @@
           </a:ln>
           <a:extLst>
             <a:ext uri="{C572A759-6A51-4108-AA02-DFA0A04FC94B}">
-              <ma14:wrappingTextBoxFlag xmlns:ma14="http://schemas.microsoft.com/office/mac/drawingml/2011/main" xmlns="" val="1"/>
+              <ma14:wrappingTextBoxFlag xmlns="" xmlns:ma14="http://schemas.microsoft.com/office/mac/drawingml/2011/main" val="1"/>
             </a:ext>
           </a:extLst>
         </p:spPr>
@@ -14003,7 +14004,7 @@
           </a:ln>
           <a:extLst>
             <a:ext uri="{C572A759-6A51-4108-AA02-DFA0A04FC94B}">
-              <ma14:wrappingTextBoxFlag xmlns:ma14="http://schemas.microsoft.com/office/mac/drawingml/2011/main" xmlns="" val="1"/>
+              <ma14:wrappingTextBoxFlag xmlns="" xmlns:ma14="http://schemas.microsoft.com/office/mac/drawingml/2011/main" val="1"/>
             </a:ext>
           </a:extLst>
         </p:spPr>
@@ -15010,6 +15011,228 @@
       </p:grpSpPr>
       <p:sp>
         <p:nvSpPr>
+          <p:cNvPr id="215" name="Shape 215"/>
+          <p:cNvSpPr>
+            <a:spLocks noGrp="1"/>
+          </p:cNvSpPr>
+          <p:nvPr>
+            <p:ph type="ctrTitle"/>
+          </p:nvPr>
+        </p:nvSpPr>
+        <p:spPr>
+          <a:xfrm>
+            <a:off x="406400" y="1536700"/>
+            <a:ext cx="12192000" cy="1169261"/>
+          </a:xfrm>
+          <a:prstGeom prst="rect">
+            <a:avLst/>
+          </a:prstGeom>
+        </p:spPr>
+        <p:txBody>
+          <a:bodyPr/>
+          <a:lstStyle>
+            <a:lvl1pPr defTabSz="403097">
+              <a:spcBef>
+                <a:spcPts val="1900"/>
+              </a:spcBef>
+              <a:defRPr sz="8200"/>
+            </a:lvl1pPr>
+          </a:lstStyle>
+          <a:p>
+            <a:r>
+              <a:t>Odds</a:t>
+            </a:r>
+          </a:p>
+        </p:txBody>
+      </p:sp>
+      <p:sp>
+        <p:nvSpPr>
+          <p:cNvPr id="216" name="Shape 216"/>
+          <p:cNvSpPr>
+            <a:spLocks noGrp="1"/>
+          </p:cNvSpPr>
+          <p:nvPr>
+            <p:ph type="subTitle" sz="quarter" idx="1"/>
+          </p:nvPr>
+        </p:nvSpPr>
+        <p:spPr>
+          <a:xfrm>
+            <a:off x="0" y="3557918"/>
+            <a:ext cx="12192000" cy="1304860"/>
+          </a:xfrm>
+          <a:prstGeom prst="rect">
+            <a:avLst/>
+          </a:prstGeom>
+        </p:spPr>
+        <p:txBody>
+          <a:bodyPr anchor="t"/>
+          <a:lstStyle>
+            <a:lvl1pPr marL="550656" indent="-550656" defTabSz="455674">
+              <a:lnSpc>
+                <a:spcPct val="100000"/>
+              </a:lnSpc>
+              <a:spcBef>
+                <a:spcPts val="2100"/>
+              </a:spcBef>
+              <a:buSzPct val="40000"/>
+              <a:buBlip>
+                <a:blip r:embed="rId2"/>
+              </a:buBlip>
+              <a:defRPr sz="4900" cap="none">
+                <a:solidFill>
+                  <a:srgbClr val="838787"/>
+                </a:solidFill>
+                <a:latin typeface="Avenir Next Medium"/>
+                <a:ea typeface="Avenir Next Medium"/>
+                <a:cs typeface="Avenir Next Medium"/>
+                <a:sym typeface="Avenir Next Medium"/>
+              </a:defRPr>
+            </a:lvl1pPr>
+          </a:lstStyle>
+          <a:p>
+            <a:r>
+              <a:t>Only valid between 0 and 1</a:t>
+            </a:r>
+          </a:p>
+        </p:txBody>
+      </p:sp>
+      <p:pic>
+        <p:nvPicPr>
+          <p:cNvPr id="217" name="Screen Shot 2019-09-17 at 12.15.05 AM.png"/>
+          <p:cNvPicPr>
+            <a:picLocks noChangeAspect="1"/>
+          </p:cNvPicPr>
+          <p:nvPr/>
+        </p:nvPicPr>
+        <p:blipFill>
+          <a:blip r:embed="rId3"/>
+          <a:stretch>
+            <a:fillRect/>
+          </a:stretch>
+        </p:blipFill>
+        <p:spPr>
+          <a:xfrm>
+            <a:off x="-1" y="3133711"/>
+            <a:ext cx="13004801" cy="4968241"/>
+          </a:xfrm>
+          <a:prstGeom prst="rect">
+            <a:avLst/>
+          </a:prstGeom>
+          <a:ln w="12700">
+            <a:miter lim="400000"/>
+          </a:ln>
+        </p:spPr>
+      </p:pic>
+      <p:sp>
+        <p:nvSpPr>
+          <p:cNvPr id="5" name="TextBox 4">
+            <a:extLst>
+              <a:ext uri="{FF2B5EF4-FFF2-40B4-BE49-F238E27FC236}">
+                <a16:creationId xmlns:a16="http://schemas.microsoft.com/office/drawing/2014/main" id="{D87046AF-CF55-1291-1474-E449B3E1AC37}"/>
+              </a:ext>
+            </a:extLst>
+          </p:cNvPr>
+          <p:cNvSpPr txBox="1"/>
+          <p:nvPr/>
+        </p:nvSpPr>
+        <p:spPr>
+          <a:xfrm>
+            <a:off x="406400" y="3190910"/>
+            <a:ext cx="8447825" cy="948978"/>
+          </a:xfrm>
+          <a:prstGeom prst="rect">
+            <a:avLst/>
+          </a:prstGeom>
+          <a:noFill/>
+          <a:ln w="12700" cap="flat">
+            <a:noFill/>
+            <a:miter lim="400000"/>
+          </a:ln>
+          <a:effectLst/>
+          <a:sp3d/>
+        </p:spPr>
+        <p:style>
+          <a:lnRef idx="0">
+            <a:scrgbClr r="0" g="0" b="0"/>
+          </a:lnRef>
+          <a:fillRef idx="0">
+            <a:scrgbClr r="0" g="0" b="0"/>
+          </a:fillRef>
+          <a:effectRef idx="0">
+            <a:scrgbClr r="0" g="0" b="0"/>
+          </a:effectRef>
+          <a:fontRef idx="none"/>
+        </p:style>
+        <p:txBody>
+          <a:bodyPr rot="0" spcFirstLastPara="1" vertOverflow="overflow" horzOverflow="overflow" vert="horz" wrap="none" lIns="50800" tIns="50800" rIns="50800" bIns="50800" numCol="1" spcCol="38100" rtlCol="0" anchor="ctr">
+            <a:spAutoFit/>
+          </a:bodyPr>
+          <a:lstStyle/>
+          <a:p>
+            <a:pPr marL="0" marR="0" indent="0" algn="l" defTabSz="584200" rtl="0" fontAlgn="auto" latinLnBrk="0" hangingPunct="0">
+              <a:lnSpc>
+                <a:spcPct val="100000"/>
+              </a:lnSpc>
+              <a:spcBef>
+                <a:spcPts val="2400"/>
+              </a:spcBef>
+              <a:spcAft>
+                <a:spcPts val="0"/>
+              </a:spcAft>
+              <a:buClrTx/>
+              <a:buSzTx/>
+              <a:buFontTx/>
+              <a:buNone/>
+              <a:tabLst/>
+            </a:pPr>
+            <a:r>
+              <a:rPr kumimoji="0" lang="en-US" sz="3500" b="0" i="0" u="none" strike="noStrike" cap="none" spc="0" normalizeH="0" baseline="0" dirty="0">
+                <a:ln>
+                  <a:noFill/>
+                </a:ln>
+                <a:solidFill>
+                  <a:srgbClr val="222222"/>
+                </a:solidFill>
+                <a:effectLst/>
+                <a:uFillTx/>
+                <a:latin typeface="DIN Condensed"/>
+                <a:ea typeface="DIN Condensed"/>
+                <a:cs typeface="DIN Condensed"/>
+                <a:sym typeface="DIN Condensed"/>
+              </a:rPr>
+              <a:t>In the case where the probability of winning is at least 50%...</a:t>
+            </a:r>
+          </a:p>
+        </p:txBody>
+      </p:sp>
+    </p:spTree>
+  </p:cSld>
+  <p:clrMapOvr>
+    <a:masterClrMapping/>
+  </p:clrMapOvr>
+  <p:transition spd="med"/>
+</p:sld>
+</file>
+
+<file path=ppt/slides/slide11.xml><?xml version="1.0" encoding="utf-8"?>
+<p:sld xmlns:a="http://schemas.openxmlformats.org/drawingml/2006/main" xmlns:r="http://schemas.openxmlformats.org/officeDocument/2006/relationships" xmlns:p="http://schemas.openxmlformats.org/presentationml/2006/main">
+  <p:cSld>
+    <p:spTree>
+      <p:nvGrpSpPr>
+        <p:cNvPr id="1" name=""/>
+        <p:cNvGrpSpPr/>
+        <p:nvPr/>
+      </p:nvGrpSpPr>
+      <p:grpSpPr>
+        <a:xfrm>
+          <a:off x="0" y="0"/>
+          <a:ext cx="0" cy="0"/>
+          <a:chOff x="0" y="0"/>
+          <a:chExt cx="0" cy="0"/>
+        </a:xfrm>
+      </p:grpSpPr>
+      <p:sp>
+        <p:nvSpPr>
           <p:cNvPr id="219" name="Shape 219"/>
           <p:cNvSpPr>
             <a:spLocks noGrp="1"/>
@@ -15050,70 +15273,231 @@
           </a:lstStyle>
           <a:p>
             <a:r>
+              <a:rPr dirty="0"/>
               <a:t>Fix #2: Log()</a:t>
             </a:r>
           </a:p>
         </p:txBody>
       </p:sp>
-      <p:sp>
-        <p:nvSpPr>
-          <p:cNvPr id="220" name="Shape 220"/>
-          <p:cNvSpPr>
-            <a:spLocks noGrp="1"/>
-          </p:cNvSpPr>
-          <p:nvPr>
-            <p:ph type="body" idx="4294967295"/>
-          </p:nvPr>
-        </p:nvSpPr>
-        <p:spPr>
-          <a:xfrm>
-            <a:off x="524933" y="2389518"/>
-            <a:ext cx="12192001" cy="6059357"/>
-          </a:xfrm>
-          <a:prstGeom prst="rect">
-            <a:avLst/>
-          </a:prstGeom>
-        </p:spPr>
-        <p:txBody>
-          <a:bodyPr lIns="50800" tIns="50800" rIns="50800" bIns="50800"/>
-          <a:lstStyle/>
-          <a:p>
-            <a:pPr marL="550656" indent="-550656" defTabSz="455674">
-              <a:spcBef>
-                <a:spcPts val="2100"/>
-              </a:spcBef>
-              <a:buSzPct val="40000"/>
-              <a:buFontTx/>
-              <a:buBlip>
-                <a:blip r:embed="rId2"/>
-              </a:buBlip>
-              <a:defRPr sz="4900">
-                <a:solidFill>
-                  <a:srgbClr val="838787"/>
-                </a:solidFill>
-                <a:latin typeface="Avenir Next Medium"/>
-                <a:ea typeface="Avenir Next Medium"/>
-                <a:cs typeface="Avenir Next Medium"/>
-                <a:sym typeface="Avenir Next Medium"/>
-              </a:defRPr>
-            </a:pPr>
-            <a:r>
-              <a:t>Evens out </a:t>
-            </a:r>
-            <a:r>
-              <a:rPr>
-                <a:solidFill>
-                  <a:schemeClr val="accent3"/>
-                </a:solidFill>
-              </a:rPr>
-              <a:t>scale</a:t>
-            </a:r>
-            <a:r>
-              <a:t> between 0-1 and rest</a:t>
-            </a:r>
-          </a:p>
-        </p:txBody>
-      </p:sp>
+      <mc:AlternateContent xmlns:mc="http://schemas.openxmlformats.org/markup-compatibility/2006">
+        <mc:Choice xmlns:a14="http://schemas.microsoft.com/office/drawing/2010/main" Requires="a14">
+          <p:sp>
+            <p:nvSpPr>
+              <p:cNvPr id="220" name="Shape 220"/>
+              <p:cNvSpPr>
+                <a:spLocks noGrp="1"/>
+              </p:cNvSpPr>
+              <p:nvPr>
+                <p:ph type="body" idx="4294967295"/>
+              </p:nvPr>
+            </p:nvSpPr>
+            <p:spPr>
+              <a:xfrm>
+                <a:off x="524934" y="2231828"/>
+                <a:ext cx="6649590" cy="7172070"/>
+              </a:xfrm>
+              <a:prstGeom prst="rect">
+                <a:avLst/>
+              </a:prstGeom>
+            </p:spPr>
+            <p:txBody>
+              <a:bodyPr lIns="50800" tIns="50800" rIns="50800" bIns="50800">
+                <a:normAutofit/>
+              </a:bodyPr>
+              <a:lstStyle/>
+              <a:p>
+                <a:pPr marL="550656" indent="-550656" defTabSz="455674">
+                  <a:spcBef>
+                    <a:spcPts val="2100"/>
+                  </a:spcBef>
+                  <a:buSzPct val="40000"/>
+                  <a:buFontTx/>
+                  <a:buBlip>
+                    <a:blip r:embed="rId2"/>
+                  </a:buBlip>
+                  <a:defRPr sz="4900">
+                    <a:solidFill>
+                      <a:srgbClr val="838787"/>
+                    </a:solidFill>
+                    <a:latin typeface="Avenir Next Medium"/>
+                    <a:ea typeface="Avenir Next Medium"/>
+                    <a:cs typeface="Avenir Next Medium"/>
+                    <a:sym typeface="Avenir Next Medium"/>
+                  </a:defRPr>
+                </a:pPr>
+                <a:r>
+                  <a:rPr lang="en-US" dirty="0"/>
+                  <a:t>Takes odds that are between 0 and 1</a:t>
+                </a:r>
+              </a:p>
+              <a:p>
+                <a:pPr marL="985403" lvl="1" indent="-550656" defTabSz="455674">
+                  <a:spcBef>
+                    <a:spcPts val="2100"/>
+                  </a:spcBef>
+                  <a:buSzPct val="40000"/>
+                  <a:buFontTx/>
+                  <a:buBlip>
+                    <a:blip r:embed="rId2"/>
+                  </a:buBlip>
+                  <a:defRPr sz="4900">
+                    <a:solidFill>
+                      <a:srgbClr val="838787"/>
+                    </a:solidFill>
+                    <a:latin typeface="Avenir Next Medium"/>
+                    <a:ea typeface="Avenir Next Medium"/>
+                    <a:cs typeface="Avenir Next Medium"/>
+                    <a:sym typeface="Avenir Next Medium"/>
+                  </a:defRPr>
+                </a:pPr>
+                <a:r>
+                  <a:rPr lang="en-US" dirty="0"/>
+                  <a:t>Stretches them from 0 to -</a:t>
+                </a:r>
+                <a14:m>
+                  <m:oMath xmlns:m="http://schemas.openxmlformats.org/officeDocument/2006/math">
+                    <m:r>
+                      <a:rPr lang="en-US" i="1" smtClean="0">
+                        <a:latin typeface="Cambria Math" panose="02040503050406030204" pitchFamily="18" charset="0"/>
+                        <a:ea typeface="Cambria Math" panose="02040503050406030204" pitchFamily="18" charset="0"/>
+                      </a:rPr>
+                      <m:t>∞</m:t>
+                    </m:r>
+                  </m:oMath>
+                </a14:m>
+                <a:r>
+                  <a:rPr lang="en-US" dirty="0"/>
+                  <a:t>. </a:t>
+                </a:r>
+              </a:p>
+              <a:p>
+                <a:pPr marL="550656" indent="-550656" defTabSz="455674">
+                  <a:spcBef>
+                    <a:spcPts val="2100"/>
+                  </a:spcBef>
+                  <a:buSzPct val="40000"/>
+                  <a:buBlip>
+                    <a:blip r:embed="rId2"/>
+                  </a:buBlip>
+                  <a:defRPr sz="4900">
+                    <a:solidFill>
+                      <a:srgbClr val="838787"/>
+                    </a:solidFill>
+                    <a:latin typeface="Avenir Next Medium"/>
+                    <a:ea typeface="Avenir Next Medium"/>
+                    <a:cs typeface="Avenir Next Medium"/>
+                    <a:sym typeface="Avenir Next Medium"/>
+                  </a:defRPr>
+                </a:pPr>
+                <a:r>
+                  <a:rPr lang="en-US" dirty="0"/>
+                  <a:t>Takes odds that are between 1 and</a:t>
+                </a:r>
+                <a:r>
+                  <a:rPr lang="en-US" dirty="0">
+                    <a:ea typeface="Cambria Math" panose="02040503050406030204" pitchFamily="18" charset="0"/>
+                  </a:rPr>
+                  <a:t> </a:t>
+                </a:r>
+                <a14:m>
+                  <m:oMath xmlns:m="http://schemas.openxmlformats.org/officeDocument/2006/math">
+                    <m:r>
+                      <a:rPr lang="en-US" i="1" smtClean="0">
+                        <a:latin typeface="Cambria Math" panose="02040503050406030204" pitchFamily="18" charset="0"/>
+                        <a:ea typeface="Cambria Math" panose="02040503050406030204" pitchFamily="18" charset="0"/>
+                      </a:rPr>
+                      <m:t>∞</m:t>
+                    </m:r>
+                  </m:oMath>
+                </a14:m>
+                <a:endParaRPr lang="en-US" dirty="0">
+                  <a:ea typeface="Cambria Math" panose="02040503050406030204" pitchFamily="18" charset="0"/>
+                </a:endParaRPr>
+              </a:p>
+              <a:p>
+                <a:pPr marL="985403" lvl="1" indent="-550656" defTabSz="455674">
+                  <a:spcBef>
+                    <a:spcPts val="2100"/>
+                  </a:spcBef>
+                  <a:buSzPct val="40000"/>
+                  <a:buBlip>
+                    <a:blip r:embed="rId2"/>
+                  </a:buBlip>
+                  <a:defRPr sz="4900">
+                    <a:solidFill>
+                      <a:srgbClr val="838787"/>
+                    </a:solidFill>
+                    <a:latin typeface="Avenir Next Medium"/>
+                    <a:ea typeface="Avenir Next Medium"/>
+                    <a:cs typeface="Avenir Next Medium"/>
+                    <a:sym typeface="Avenir Next Medium"/>
+                  </a:defRPr>
+                </a:pPr>
+                <a:r>
+                  <a:rPr lang="en-US" dirty="0"/>
+                  <a:t>Shifts them to range from 0 to </a:t>
+                </a:r>
+                <a14:m>
+                  <m:oMath xmlns:m="http://schemas.openxmlformats.org/officeDocument/2006/math">
+                    <m:r>
+                      <a:rPr lang="en-US" i="1" smtClean="0">
+                        <a:latin typeface="Cambria Math" panose="02040503050406030204" pitchFamily="18" charset="0"/>
+                        <a:ea typeface="Cambria Math" panose="02040503050406030204" pitchFamily="18" charset="0"/>
+                      </a:rPr>
+                      <m:t>∞</m:t>
+                    </m:r>
+                  </m:oMath>
+                </a14:m>
+                <a:r>
+                  <a:rPr lang="en-US" dirty="0"/>
+                  <a:t>.</a:t>
+                </a:r>
+                <a:endParaRPr dirty="0"/>
+              </a:p>
+            </p:txBody>
+          </p:sp>
+        </mc:Choice>
+        <mc:Fallback>
+          <p:sp>
+            <p:nvSpPr>
+              <p:cNvPr id="220" name="Shape 220"/>
+              <p:cNvSpPr>
+                <a:spLocks noGrp="1" noRot="1" noChangeAspect="1" noMove="1" noResize="1" noEditPoints="1" noAdjustHandles="1" noChangeArrowheads="1" noChangeShapeType="1" noTextEdit="1"/>
+              </p:cNvSpPr>
+              <p:nvPr>
+                <p:ph type="body" idx="4294967295"/>
+              </p:nvPr>
+            </p:nvSpPr>
+            <p:spPr>
+              <a:xfrm>
+                <a:off x="524934" y="2231828"/>
+                <a:ext cx="6649590" cy="7172070"/>
+              </a:xfrm>
+              <a:prstGeom prst="rect">
+                <a:avLst/>
+              </a:prstGeom>
+              <a:blipFill>
+                <a:blip r:embed="rId3"/>
+                <a:stretch>
+                  <a:fillRect t="-1943" r="-954" b="-707"/>
+                </a:stretch>
+              </a:blipFill>
+            </p:spPr>
+            <p:txBody>
+              <a:bodyPr/>
+              <a:lstStyle/>
+              <a:p>
+                <a:r>
+                  <a:rPr lang="en-US">
+                    <a:noFill/>
+                  </a:rPr>
+                  <a:t> </a:t>
+                </a:r>
+              </a:p>
+            </p:txBody>
+          </p:sp>
+        </mc:Fallback>
+      </mc:AlternateContent>
       <p:pic>
         <p:nvPicPr>
           <p:cNvPr id="221" name="pasted-image.gif"/>
@@ -15123,15 +15507,15 @@
           <p:nvPr/>
         </p:nvPicPr>
         <p:blipFill>
-          <a:blip r:embed="rId3"/>
+          <a:blip r:embed="rId4"/>
           <a:stretch>
             <a:fillRect/>
           </a:stretch>
         </p:blipFill>
         <p:spPr>
           <a:xfrm>
-            <a:off x="1083733" y="3415863"/>
-            <a:ext cx="7996702" cy="6059357"/>
+            <a:off x="7332931" y="2389518"/>
+            <a:ext cx="5384003" cy="4079631"/>
           </a:xfrm>
           <a:prstGeom prst="rect">
             <a:avLst/>
@@ -15150,7 +15534,7 @@
 </p:sld>
 </file>
 
-<file path=ppt/slides/slide11.xml><?xml version="1.0" encoding="utf-8"?>
+<file path=ppt/slides/slide12.xml><?xml version="1.0" encoding="utf-8"?>
 <p:sld xmlns:a="http://schemas.openxmlformats.org/drawingml/2006/main" xmlns:r="http://schemas.openxmlformats.org/officeDocument/2006/relationships" xmlns:p="http://schemas.openxmlformats.org/presentationml/2006/main">
   <p:cSld>
     <p:spTree>
@@ -15249,8 +15633,10 @@
           </a:lstStyle>
           <a:p>
             <a:r>
-              <a:t>Log-Odds</a:t>
-            </a:r>
+              <a:rPr lang="en-US" dirty="0"/>
+              <a:t>Fix #2: Log()</a:t>
+            </a:r>
+            <a:endParaRPr dirty="0"/>
           </a:p>
         </p:txBody>
       </p:sp>
@@ -15263,7 +15649,7 @@
 </p:sld>
 </file>
 
-<file path=ppt/slides/slide12.xml><?xml version="1.0" encoding="utf-8"?>
+<file path=ppt/slides/slide13.xml><?xml version="1.0" encoding="utf-8"?>
 <p:sld xmlns:a="http://schemas.openxmlformats.org/drawingml/2006/main" xmlns:r="http://schemas.openxmlformats.org/officeDocument/2006/relationships" xmlns:p="http://schemas.openxmlformats.org/presentationml/2006/main">
   <p:cSld>
     <p:spTree>
@@ -15346,7 +15732,7 @@
           </a:ln>
           <a:extLst>
             <a:ext uri="{C572A759-6A51-4108-AA02-DFA0A04FC94B}">
-              <ma14:wrappingTextBoxFlag xmlns:ma14="http://schemas.microsoft.com/office/mac/drawingml/2011/main" xmlns="" val="1"/>
+              <ma14:wrappingTextBoxFlag xmlns="" xmlns:ma14="http://schemas.microsoft.com/office/mac/drawingml/2011/main" val="1"/>
             </a:ext>
           </a:extLst>
         </p:spPr>
@@ -15412,7 +15798,7 @@
 </p:sld>
 </file>
 
-<file path=ppt/slides/slide13.xml><?xml version="1.0" encoding="utf-8"?>
+<file path=ppt/slides/slide14.xml><?xml version="1.0" encoding="utf-8"?>
 <p:sld xmlns:a="http://schemas.openxmlformats.org/drawingml/2006/main" xmlns:r="http://schemas.openxmlformats.org/officeDocument/2006/relationships" xmlns:p="http://schemas.openxmlformats.org/presentationml/2006/main">
   <p:cSld>
     <p:bg>
@@ -15473,7 +15859,7 @@
 </p:sld>
 </file>
 
-<file path=ppt/slides/slide14.xml><?xml version="1.0" encoding="utf-8"?>
+<file path=ppt/slides/slide15.xml><?xml version="1.0" encoding="utf-8"?>
 <p:sld xmlns:a="http://schemas.openxmlformats.org/drawingml/2006/main" xmlns:r="http://schemas.openxmlformats.org/officeDocument/2006/relationships" xmlns:p="http://schemas.openxmlformats.org/presentationml/2006/main">
   <p:cSld>
     <p:spTree>
@@ -15617,7 +16003,7 @@
 </p:sld>
 </file>
 
-<file path=ppt/slides/slide15.xml><?xml version="1.0" encoding="utf-8"?>
+<file path=ppt/slides/slide16.xml><?xml version="1.0" encoding="utf-8"?>
 <p:sld xmlns:a="http://schemas.openxmlformats.org/drawingml/2006/main" xmlns:r="http://schemas.openxmlformats.org/officeDocument/2006/relationships" xmlns:p="http://schemas.openxmlformats.org/presentationml/2006/main">
   <p:cSld>
     <p:spTree>
@@ -15736,7 +16122,7 @@
 </p:sld>
 </file>
 
-<file path=ppt/slides/slide16.xml><?xml version="1.0" encoding="utf-8"?>
+<file path=ppt/slides/slide17.xml><?xml version="1.0" encoding="utf-8"?>
 <p:sld xmlns:a="http://schemas.openxmlformats.org/drawingml/2006/main" xmlns:r="http://schemas.openxmlformats.org/officeDocument/2006/relationships" xmlns:p="http://schemas.openxmlformats.org/presentationml/2006/main">
   <p:cSld>
     <p:spTree>
@@ -15910,7 +16296,7 @@
 </p:sld>
 </file>
 
-<file path=ppt/slides/slide17.xml><?xml version="1.0" encoding="utf-8"?>
+<file path=ppt/slides/slide18.xml><?xml version="1.0" encoding="utf-8"?>
 <p:sld xmlns:a="http://schemas.openxmlformats.org/drawingml/2006/main" xmlns:r="http://schemas.openxmlformats.org/officeDocument/2006/relationships" xmlns:p="http://schemas.openxmlformats.org/presentationml/2006/main">
   <p:cSld>
     <p:spTree>
@@ -16090,7 +16476,7 @@
 </p:sld>
 </file>
 
-<file path=ppt/slides/slide18.xml><?xml version="1.0" encoding="utf-8"?>
+<file path=ppt/slides/slide19.xml><?xml version="1.0" encoding="utf-8"?>
 <p:sld xmlns:a="http://schemas.openxmlformats.org/drawingml/2006/main" xmlns:r="http://schemas.openxmlformats.org/officeDocument/2006/relationships" xmlns:p="http://schemas.openxmlformats.org/presentationml/2006/main">
   <p:cSld>
     <p:spTree>
@@ -16324,7 +16710,55 @@
 </p:sld>
 </file>
 
-<file path=ppt/slides/slide19.xml><?xml version="1.0" encoding="utf-8"?>
+<file path=ppt/slides/slide2.xml><?xml version="1.0" encoding="utf-8"?>
+<p:sld xmlns:a="http://schemas.openxmlformats.org/drawingml/2006/main" xmlns:r="http://schemas.openxmlformats.org/officeDocument/2006/relationships" xmlns:p="http://schemas.openxmlformats.org/presentationml/2006/main">
+  <p:cSld>
+    <p:spTree>
+      <p:nvGrpSpPr>
+        <p:cNvPr id="1" name=""/>
+        <p:cNvGrpSpPr/>
+        <p:nvPr/>
+      </p:nvGrpSpPr>
+      <p:grpSpPr>
+        <a:xfrm>
+          <a:off x="0" y="0"/>
+          <a:ext cx="0" cy="0"/>
+          <a:chOff x="0" y="0"/>
+          <a:chExt cx="0" cy="0"/>
+        </a:xfrm>
+      </p:grpSpPr>
+      <p:sp>
+        <p:nvSpPr>
+          <p:cNvPr id="194" name="Shape 194"/>
+          <p:cNvSpPr>
+            <a:spLocks noGrp="1"/>
+          </p:cNvSpPr>
+          <p:nvPr>
+            <p:ph type="title"/>
+          </p:nvPr>
+        </p:nvSpPr>
+        <p:spPr/>
+        <p:txBody>
+          <a:bodyPr/>
+          <a:lstStyle/>
+          <a:p>
+            <a:r>
+              <a:rPr lang="en-US"/>
+              <a:t>Logistic Regression</a:t>
+            </a:r>
+          </a:p>
+        </p:txBody>
+      </p:sp>
+    </p:spTree>
+  </p:cSld>
+  <p:clrMapOvr>
+    <a:masterClrMapping/>
+  </p:clrMapOvr>
+  <p:transition spd="med"/>
+</p:sld>
+</file>
+
+<file path=ppt/slides/slide20.xml><?xml version="1.0" encoding="utf-8"?>
 <p:sld xmlns:a="http://schemas.openxmlformats.org/drawingml/2006/main" xmlns:r="http://schemas.openxmlformats.org/officeDocument/2006/relationships" xmlns:p="http://schemas.openxmlformats.org/presentationml/2006/main">
   <p:cSld>
     <p:spTree>
@@ -16426,55 +16860,7 @@
 </p:sld>
 </file>
 
-<file path=ppt/slides/slide2.xml><?xml version="1.0" encoding="utf-8"?>
-<p:sld xmlns:a="http://schemas.openxmlformats.org/drawingml/2006/main" xmlns:r="http://schemas.openxmlformats.org/officeDocument/2006/relationships" xmlns:p="http://schemas.openxmlformats.org/presentationml/2006/main">
-  <p:cSld>
-    <p:spTree>
-      <p:nvGrpSpPr>
-        <p:cNvPr id="1" name=""/>
-        <p:cNvGrpSpPr/>
-        <p:nvPr/>
-      </p:nvGrpSpPr>
-      <p:grpSpPr>
-        <a:xfrm>
-          <a:off x="0" y="0"/>
-          <a:ext cx="0" cy="0"/>
-          <a:chOff x="0" y="0"/>
-          <a:chExt cx="0" cy="0"/>
-        </a:xfrm>
-      </p:grpSpPr>
-      <p:sp>
-        <p:nvSpPr>
-          <p:cNvPr id="194" name="Shape 194"/>
-          <p:cNvSpPr>
-            <a:spLocks noGrp="1"/>
-          </p:cNvSpPr>
-          <p:nvPr>
-            <p:ph type="title"/>
-          </p:nvPr>
-        </p:nvSpPr>
-        <p:spPr/>
-        <p:txBody>
-          <a:bodyPr/>
-          <a:lstStyle/>
-          <a:p>
-            <a:r>
-              <a:rPr lang="en-US"/>
-              <a:t>Logistic Regression</a:t>
-            </a:r>
-          </a:p>
-        </p:txBody>
-      </p:sp>
-    </p:spTree>
-  </p:cSld>
-  <p:clrMapOvr>
-    <a:masterClrMapping/>
-  </p:clrMapOvr>
-  <p:transition spd="med"/>
-</p:sld>
-</file>
-
-<file path=ppt/slides/slide20.xml><?xml version="1.0" encoding="utf-8"?>
+<file path=ppt/slides/slide21.xml><?xml version="1.0" encoding="utf-8"?>
 <p:sld xmlns:a="http://schemas.openxmlformats.org/drawingml/2006/main" xmlns:r="http://schemas.openxmlformats.org/officeDocument/2006/relationships" xmlns:p="http://schemas.openxmlformats.org/presentationml/2006/main">
   <p:cSld>
     <p:spTree>
@@ -16522,7 +16908,7 @@
 </p:sld>
 </file>
 
-<file path=ppt/slides/slide21.xml><?xml version="1.0" encoding="utf-8"?>
+<file path=ppt/slides/slide22.xml><?xml version="1.0" encoding="utf-8"?>
 <p:sld xmlns:a="http://schemas.openxmlformats.org/drawingml/2006/main" xmlns:r="http://schemas.openxmlformats.org/officeDocument/2006/relationships" xmlns:p="http://schemas.openxmlformats.org/presentationml/2006/main">
   <p:cSld>
     <p:spTree>
@@ -16648,7 +17034,7 @@
 </p:sld>
 </file>
 
-<file path=ppt/slides/slide22.xml><?xml version="1.0" encoding="utf-8"?>
+<file path=ppt/slides/slide23.xml><?xml version="1.0" encoding="utf-8"?>
 <p:sld xmlns:a="http://schemas.openxmlformats.org/drawingml/2006/main" xmlns:r="http://schemas.openxmlformats.org/officeDocument/2006/relationships" xmlns:p="http://schemas.openxmlformats.org/presentationml/2006/main">
   <p:cSld>
     <p:spTree>
@@ -16701,7 +17087,7 @@
 </p:sld>
 </file>
 
-<file path=ppt/slides/slide23.xml><?xml version="1.0" encoding="utf-8"?>
+<file path=ppt/slides/slide24.xml><?xml version="1.0" encoding="utf-8"?>
 <p:sld xmlns:a="http://schemas.openxmlformats.org/drawingml/2006/main" xmlns:r="http://schemas.openxmlformats.org/officeDocument/2006/relationships" xmlns:p="http://schemas.openxmlformats.org/presentationml/2006/main">
   <p:cSld>
     <p:spTree>
@@ -16827,7 +17213,7 @@
 </p:sld>
 </file>
 
-<file path=ppt/slides/slide24.xml><?xml version="1.0" encoding="utf-8"?>
+<file path=ppt/slides/slide25.xml><?xml version="1.0" encoding="utf-8"?>
 <p:sld xmlns:a="http://schemas.openxmlformats.org/drawingml/2006/main" xmlns:r="http://schemas.openxmlformats.org/officeDocument/2006/relationships" xmlns:p="http://schemas.openxmlformats.org/presentationml/2006/main">
   <p:cSld>
     <p:spTree>
@@ -16953,7 +17339,7 @@
 </p:sld>
 </file>
 
-<file path=ppt/slides/slide25.xml><?xml version="1.0" encoding="utf-8"?>
+<file path=ppt/slides/slide26.xml><?xml version="1.0" encoding="utf-8"?>
 <p:sld xmlns:a="http://schemas.openxmlformats.org/drawingml/2006/main" xmlns:r="http://schemas.openxmlformats.org/officeDocument/2006/relationships" xmlns:p="http://schemas.openxmlformats.org/presentationml/2006/main">
   <p:cSld>
     <p:spTree>
@@ -17006,7 +17392,7 @@
 </p:sld>
 </file>
 
-<file path=ppt/slides/slide26.xml><?xml version="1.0" encoding="utf-8"?>
+<file path=ppt/slides/slide27.xml><?xml version="1.0" encoding="utf-8"?>
 <p:sld xmlns:a="http://schemas.openxmlformats.org/drawingml/2006/main" xmlns:r="http://schemas.openxmlformats.org/officeDocument/2006/relationships" xmlns:p="http://schemas.openxmlformats.org/presentationml/2006/main">
   <p:cSld>
     <p:spTree>
@@ -17132,7 +17518,7 @@
 </p:sld>
 </file>
 
-<file path=ppt/slides/slide27.xml><?xml version="1.0" encoding="utf-8"?>
+<file path=ppt/slides/slide28.xml><?xml version="1.0" encoding="utf-8"?>
 <p:sld xmlns:a="http://schemas.openxmlformats.org/drawingml/2006/main" xmlns:r="http://schemas.openxmlformats.org/officeDocument/2006/relationships" xmlns:p="http://schemas.openxmlformats.org/presentationml/2006/main">
   <p:cSld>
     <p:spTree>
@@ -17185,7 +17571,7 @@
 </p:sld>
 </file>
 
-<file path=ppt/slides/slide28.xml><?xml version="1.0" encoding="utf-8"?>
+<file path=ppt/slides/slide29.xml><?xml version="1.0" encoding="utf-8"?>
 <p:sld xmlns:a="http://schemas.openxmlformats.org/drawingml/2006/main" xmlns:r="http://schemas.openxmlformats.org/officeDocument/2006/relationships" xmlns:p="http://schemas.openxmlformats.org/presentationml/2006/main">
   <p:cSld>
     <p:spTree>
@@ -17320,7 +17706,147 @@
 </p:sld>
 </file>
 
-<file path=ppt/slides/slide29.xml><?xml version="1.0" encoding="utf-8"?>
+<file path=ppt/slides/slide3.xml><?xml version="1.0" encoding="utf-8"?>
+<p:sld xmlns:a="http://schemas.openxmlformats.org/drawingml/2006/main" xmlns:r="http://schemas.openxmlformats.org/officeDocument/2006/relationships" xmlns:p="http://schemas.openxmlformats.org/presentationml/2006/main">
+  <p:cSld>
+    <p:spTree>
+      <p:nvGrpSpPr>
+        <p:cNvPr id="1" name=""/>
+        <p:cNvGrpSpPr/>
+        <p:nvPr/>
+      </p:nvGrpSpPr>
+      <p:grpSpPr>
+        <a:xfrm>
+          <a:off x="0" y="0"/>
+          <a:ext cx="0" cy="0"/>
+          <a:chOff x="0" y="0"/>
+          <a:chExt cx="0" cy="0"/>
+        </a:xfrm>
+      </p:grpSpPr>
+      <p:sp>
+        <p:nvSpPr>
+          <p:cNvPr id="196" name="Shape 196"/>
+          <p:cNvSpPr>
+            <a:spLocks noGrp="1"/>
+          </p:cNvSpPr>
+          <p:nvPr>
+            <p:ph type="title"/>
+          </p:nvPr>
+        </p:nvSpPr>
+        <p:spPr>
+          <a:xfrm>
+            <a:off x="406400" y="1536700"/>
+            <a:ext cx="12192000" cy="1169261"/>
+          </a:xfrm>
+          <a:prstGeom prst="rect">
+            <a:avLst/>
+          </a:prstGeom>
+        </p:spPr>
+        <p:txBody>
+          <a:bodyPr/>
+          <a:lstStyle>
+            <a:lvl1pPr defTabSz="403097">
+              <a:spcBef>
+                <a:spcPts val="1900"/>
+              </a:spcBef>
+              <a:defRPr sz="8200"/>
+            </a:lvl1pPr>
+          </a:lstStyle>
+          <a:p>
+            <a:r>
+              <a:t>Logistic Regression</a:t>
+            </a:r>
+          </a:p>
+        </p:txBody>
+      </p:sp>
+      <p:sp>
+        <p:nvSpPr>
+          <p:cNvPr id="197" name="Shape 197"/>
+          <p:cNvSpPr>
+            <a:spLocks noGrp="1"/>
+          </p:cNvSpPr>
+          <p:nvPr>
+            <p:ph type="body" sz="half" idx="1"/>
+          </p:nvPr>
+        </p:nvSpPr>
+        <p:spPr>
+          <a:xfrm>
+            <a:off x="406400" y="4186733"/>
+            <a:ext cx="12192000" cy="4152372"/>
+          </a:xfrm>
+          <a:prstGeom prst="rect">
+            <a:avLst/>
+          </a:prstGeom>
+        </p:spPr>
+        <p:txBody>
+          <a:bodyPr anchor="t"/>
+          <a:lstStyle/>
+          <a:p>
+            <a:pPr marL="550656" indent="-550656" defTabSz="455674">
+              <a:lnSpc>
+                <a:spcPct val="100000"/>
+              </a:lnSpc>
+              <a:spcBef>
+                <a:spcPts val="2100"/>
+              </a:spcBef>
+              <a:buSzPct val="40000"/>
+              <a:buBlip>
+                <a:blip r:embed="rId2"/>
+              </a:buBlip>
+              <a:defRPr sz="4900" cap="none" spc="0">
+                <a:latin typeface="Avenir Next Medium"/>
+                <a:ea typeface="Avenir Next Medium"/>
+                <a:cs typeface="Avenir Next Medium"/>
+                <a:sym typeface="Avenir Next Medium"/>
+              </a:defRPr>
+            </a:pPr>
+            <a:r>
+              <a:rPr>
+                <a:solidFill>
+                  <a:schemeClr val="accent3"/>
+                </a:solidFill>
+              </a:rPr>
+              <a:t>Modify output</a:t>
+            </a:r>
+            <a:r>
+              <a:t> of linear model to be a probability</a:t>
+            </a:r>
+          </a:p>
+          <a:p>
+            <a:pPr marL="550656" indent="-550656" defTabSz="455674">
+              <a:lnSpc>
+                <a:spcPct val="100000"/>
+              </a:lnSpc>
+              <a:spcBef>
+                <a:spcPts val="2100"/>
+              </a:spcBef>
+              <a:buSzPct val="40000"/>
+              <a:buBlip>
+                <a:blip r:embed="rId2"/>
+              </a:buBlip>
+              <a:defRPr sz="4900" cap="none" spc="0">
+                <a:latin typeface="Avenir Next Medium"/>
+                <a:ea typeface="Avenir Next Medium"/>
+                <a:cs typeface="Avenir Next Medium"/>
+                <a:sym typeface="Avenir Next Medium"/>
+              </a:defRPr>
+            </a:pPr>
+            <a:r>
+              <a:t>Used for classification, despite name</a:t>
+            </a:r>
+          </a:p>
+        </p:txBody>
+      </p:sp>
+    </p:spTree>
+  </p:cSld>
+  <p:clrMapOvr>
+    <a:masterClrMapping/>
+  </p:clrMapOvr>
+  <p:transition spd="med"/>
+</p:sld>
+</file>
+
+<file path=ppt/slides/slide30.xml><?xml version="1.0" encoding="utf-8"?>
 <p:sld xmlns:a="http://schemas.openxmlformats.org/drawingml/2006/main" xmlns:r="http://schemas.openxmlformats.org/officeDocument/2006/relationships" xmlns:p="http://schemas.openxmlformats.org/presentationml/2006/main">
   <p:cSld>
     <p:spTree>
@@ -17386,7 +17912,7 @@
           </a:ln>
           <a:extLst>
             <a:ext uri="{C572A759-6A51-4108-AA02-DFA0A04FC94B}">
-              <ma14:wrappingTextBoxFlag xmlns:ma14="http://schemas.microsoft.com/office/mac/drawingml/2011/main" xmlns="" val="1"/>
+              <ma14:wrappingTextBoxFlag xmlns="" xmlns:ma14="http://schemas.microsoft.com/office/mac/drawingml/2011/main" val="1"/>
             </a:ext>
           </a:extLst>
         </p:spPr>
@@ -17429,7 +17955,7 @@
           </a:ln>
           <a:extLst>
             <a:ext uri="{C572A759-6A51-4108-AA02-DFA0A04FC94B}">
-              <ma14:wrappingTextBoxFlag xmlns:ma14="http://schemas.microsoft.com/office/mac/drawingml/2011/main" xmlns="" val="1"/>
+              <ma14:wrappingTextBoxFlag xmlns="" xmlns:ma14="http://schemas.microsoft.com/office/mac/drawingml/2011/main" val="1"/>
             </a:ext>
           </a:extLst>
         </p:spPr>
@@ -17462,147 +17988,7 @@
 </p:sld>
 </file>
 
-<file path=ppt/slides/slide3.xml><?xml version="1.0" encoding="utf-8"?>
-<p:sld xmlns:a="http://schemas.openxmlformats.org/drawingml/2006/main" xmlns:r="http://schemas.openxmlformats.org/officeDocument/2006/relationships" xmlns:p="http://schemas.openxmlformats.org/presentationml/2006/main">
-  <p:cSld>
-    <p:spTree>
-      <p:nvGrpSpPr>
-        <p:cNvPr id="1" name=""/>
-        <p:cNvGrpSpPr/>
-        <p:nvPr/>
-      </p:nvGrpSpPr>
-      <p:grpSpPr>
-        <a:xfrm>
-          <a:off x="0" y="0"/>
-          <a:ext cx="0" cy="0"/>
-          <a:chOff x="0" y="0"/>
-          <a:chExt cx="0" cy="0"/>
-        </a:xfrm>
-      </p:grpSpPr>
-      <p:sp>
-        <p:nvSpPr>
-          <p:cNvPr id="196" name="Shape 196"/>
-          <p:cNvSpPr>
-            <a:spLocks noGrp="1"/>
-          </p:cNvSpPr>
-          <p:nvPr>
-            <p:ph type="title"/>
-          </p:nvPr>
-        </p:nvSpPr>
-        <p:spPr>
-          <a:xfrm>
-            <a:off x="406400" y="1536700"/>
-            <a:ext cx="12192000" cy="1169261"/>
-          </a:xfrm>
-          <a:prstGeom prst="rect">
-            <a:avLst/>
-          </a:prstGeom>
-        </p:spPr>
-        <p:txBody>
-          <a:bodyPr/>
-          <a:lstStyle>
-            <a:lvl1pPr defTabSz="403097">
-              <a:spcBef>
-                <a:spcPts val="1900"/>
-              </a:spcBef>
-              <a:defRPr sz="8200"/>
-            </a:lvl1pPr>
-          </a:lstStyle>
-          <a:p>
-            <a:r>
-              <a:t>Logistic Regression</a:t>
-            </a:r>
-          </a:p>
-        </p:txBody>
-      </p:sp>
-      <p:sp>
-        <p:nvSpPr>
-          <p:cNvPr id="197" name="Shape 197"/>
-          <p:cNvSpPr>
-            <a:spLocks noGrp="1"/>
-          </p:cNvSpPr>
-          <p:nvPr>
-            <p:ph type="body" sz="half" idx="1"/>
-          </p:nvPr>
-        </p:nvSpPr>
-        <p:spPr>
-          <a:xfrm>
-            <a:off x="406400" y="4186733"/>
-            <a:ext cx="12192000" cy="4152372"/>
-          </a:xfrm>
-          <a:prstGeom prst="rect">
-            <a:avLst/>
-          </a:prstGeom>
-        </p:spPr>
-        <p:txBody>
-          <a:bodyPr anchor="t"/>
-          <a:lstStyle/>
-          <a:p>
-            <a:pPr marL="550656" indent="-550656" defTabSz="455674">
-              <a:lnSpc>
-                <a:spcPct val="100000"/>
-              </a:lnSpc>
-              <a:spcBef>
-                <a:spcPts val="2100"/>
-              </a:spcBef>
-              <a:buSzPct val="40000"/>
-              <a:buBlip>
-                <a:blip r:embed="rId2"/>
-              </a:buBlip>
-              <a:defRPr sz="4900" cap="none" spc="0">
-                <a:latin typeface="Avenir Next Medium"/>
-                <a:ea typeface="Avenir Next Medium"/>
-                <a:cs typeface="Avenir Next Medium"/>
-                <a:sym typeface="Avenir Next Medium"/>
-              </a:defRPr>
-            </a:pPr>
-            <a:r>
-              <a:rPr>
-                <a:solidFill>
-                  <a:schemeClr val="accent3"/>
-                </a:solidFill>
-              </a:rPr>
-              <a:t>Modify output</a:t>
-            </a:r>
-            <a:r>
-              <a:t> of linear model to be a probability</a:t>
-            </a:r>
-          </a:p>
-          <a:p>
-            <a:pPr marL="550656" indent="-550656" defTabSz="455674">
-              <a:lnSpc>
-                <a:spcPct val="100000"/>
-              </a:lnSpc>
-              <a:spcBef>
-                <a:spcPts val="2100"/>
-              </a:spcBef>
-              <a:buSzPct val="40000"/>
-              <a:buBlip>
-                <a:blip r:embed="rId2"/>
-              </a:buBlip>
-              <a:defRPr sz="4900" cap="none" spc="0">
-                <a:latin typeface="Avenir Next Medium"/>
-                <a:ea typeface="Avenir Next Medium"/>
-                <a:cs typeface="Avenir Next Medium"/>
-                <a:sym typeface="Avenir Next Medium"/>
-              </a:defRPr>
-            </a:pPr>
-            <a:r>
-              <a:t>Used for classification, despite name</a:t>
-            </a:r>
-          </a:p>
-        </p:txBody>
-      </p:sp>
-    </p:spTree>
-  </p:cSld>
-  <p:clrMapOvr>
-    <a:masterClrMapping/>
-  </p:clrMapOvr>
-  <p:transition spd="med"/>
-</p:sld>
-</file>
-
-<file path=ppt/slides/slide30.xml><?xml version="1.0" encoding="utf-8"?>
+<file path=ppt/slides/slide31.xml><?xml version="1.0" encoding="utf-8"?>
 <p:sld xmlns:a="http://schemas.openxmlformats.org/drawingml/2006/main" xmlns:r="http://schemas.openxmlformats.org/officeDocument/2006/relationships" xmlns:p="http://schemas.openxmlformats.org/presentationml/2006/main">
   <p:cSld>
     <p:spTree>
@@ -17650,7 +18036,7 @@
 </p:sld>
 </file>
 
-<file path=ppt/slides/slide31.xml><?xml version="1.0" encoding="utf-8"?>
+<file path=ppt/slides/slide32.xml><?xml version="1.0" encoding="utf-8"?>
 <p:sld xmlns:a="http://schemas.openxmlformats.org/drawingml/2006/main" xmlns:r="http://schemas.openxmlformats.org/officeDocument/2006/relationships" xmlns:p="http://schemas.openxmlformats.org/presentationml/2006/main">
   <p:cSld>
     <p:spTree>
@@ -17700,7 +18086,7 @@
 </p:sld>
 </file>
 
-<file path=ppt/slides/slide32.xml><?xml version="1.0" encoding="utf-8"?>
+<file path=ppt/slides/slide33.xml><?xml version="1.0" encoding="utf-8"?>
 <p:sld xmlns:a="http://schemas.openxmlformats.org/drawingml/2006/main" xmlns:r="http://schemas.openxmlformats.org/officeDocument/2006/relationships" xmlns:p="http://schemas.openxmlformats.org/presentationml/2006/main">
   <p:cSld>
     <p:spTree>
@@ -17773,7 +18159,9 @@
           </a:prstGeom>
         </p:spPr>
         <p:txBody>
-          <a:bodyPr anchor="t"/>
+          <a:bodyPr anchor="t">
+            <a:normAutofit lnSpcReduction="10000"/>
+          </a:bodyPr>
           <a:lstStyle/>
           <a:p>
             <a:pPr marL="663612" indent="-663612" defTabSz="549148">
@@ -17795,7 +18183,16 @@
               </a:defRPr>
             </a:pPr>
             <a:r>
-              <a:t>Randomly selecting rows USUALLY class proportions</a:t>
+              <a:rPr dirty="0"/>
+              <a:t>Randomly selecting rows USUALLY </a:t>
+            </a:r>
+            <a:r>
+              <a:rPr lang="en-US" dirty="0"/>
+              <a:t>yields the correct </a:t>
+            </a:r>
+            <a:r>
+              <a:rPr dirty="0"/>
+              <a:t>class proportions</a:t>
             </a:r>
           </a:p>
           <a:p>
@@ -17818,6 +18215,7 @@
               </a:defRPr>
             </a:pPr>
             <a:r>
+              <a:rPr dirty="0"/>
               <a:t>However, when positive cases are sparse, LOTS of variance </a:t>
             </a:r>
           </a:p>
@@ -17832,7 +18230,7 @@
 </p:sld>
 </file>
 
-<file path=ppt/slides/slide33.xml><?xml version="1.0" encoding="utf-8"?>
+<file path=ppt/slides/slide34.xml><?xml version="1.0" encoding="utf-8"?>
 <p:sld xmlns:a="http://schemas.openxmlformats.org/drawingml/2006/main" xmlns:r="http://schemas.openxmlformats.org/officeDocument/2006/relationships" xmlns:p="http://schemas.openxmlformats.org/presentationml/2006/main">
   <p:cSld>
     <p:spTree>
@@ -17886,7 +18284,7 @@
 </p:sld>
 </file>
 
-<file path=ppt/slides/slide34.xml><?xml version="1.0" encoding="utf-8"?>
+<file path=ppt/slides/slide35.xml><?xml version="1.0" encoding="utf-8"?>
 <p:sld xmlns:a="http://schemas.openxmlformats.org/drawingml/2006/main" xmlns:r="http://schemas.openxmlformats.org/officeDocument/2006/relationships" xmlns:p="http://schemas.openxmlformats.org/presentationml/2006/main">
   <p:cSld>
     <p:spTree>
@@ -17962,7 +18360,7 @@
 </p:sld>
 </file>
 
-<file path=ppt/slides/slide35.xml><?xml version="1.0" encoding="utf-8"?>
+<file path=ppt/slides/slide36.xml><?xml version="1.0" encoding="utf-8"?>
 <p:sld xmlns:a="http://schemas.openxmlformats.org/drawingml/2006/main" xmlns:r="http://schemas.openxmlformats.org/officeDocument/2006/relationships" xmlns:p="http://schemas.openxmlformats.org/presentationml/2006/main">
   <p:cSld>
     <p:spTree>
@@ -18094,7 +18492,7 @@
 </p:sld>
 </file>
 
-<file path=ppt/slides/slide36.xml><?xml version="1.0" encoding="utf-8"?>
+<file path=ppt/slides/slide37.xml><?xml version="1.0" encoding="utf-8"?>
 <p:sld xmlns:a="http://schemas.openxmlformats.org/drawingml/2006/main" xmlns:r="http://schemas.openxmlformats.org/officeDocument/2006/relationships" xmlns:p="http://schemas.openxmlformats.org/presentationml/2006/main">
   <p:cSld>
     <p:spTree>
@@ -18204,7 +18602,7 @@
 </p:sld>
 </file>
 
-<file path=ppt/slides/slide37.xml><?xml version="1.0" encoding="utf-8"?>
+<file path=ppt/slides/slide38.xml><?xml version="1.0" encoding="utf-8"?>
 <p:sld xmlns:a="http://schemas.openxmlformats.org/drawingml/2006/main" xmlns:r="http://schemas.openxmlformats.org/officeDocument/2006/relationships" xmlns:p="http://schemas.openxmlformats.org/presentationml/2006/main">
   <p:cSld>
     <p:spTree>
@@ -18257,7 +18655,7 @@
 </p:sld>
 </file>
 
-<file path=ppt/slides/slide38.xml><?xml version="1.0" encoding="utf-8"?>
+<file path=ppt/slides/slide39.xml><?xml version="1.0" encoding="utf-8"?>
 <p:sld xmlns:a="http://schemas.openxmlformats.org/drawingml/2006/main" xmlns:r="http://schemas.openxmlformats.org/officeDocument/2006/relationships" xmlns:p="http://schemas.openxmlformats.org/presentationml/2006/main">
   <p:cSld>
     <p:spTree>
@@ -18404,7 +18802,141 @@
 </p:sld>
 </file>
 
-<file path=ppt/slides/slide39.xml><?xml version="1.0" encoding="utf-8"?>
+<file path=ppt/slides/slide4.xml><?xml version="1.0" encoding="utf-8"?>
+<p:sld xmlns:a="http://schemas.openxmlformats.org/drawingml/2006/main" xmlns:r="http://schemas.openxmlformats.org/officeDocument/2006/relationships" xmlns:p="http://schemas.openxmlformats.org/presentationml/2006/main">
+  <p:cSld>
+    <p:spTree>
+      <p:nvGrpSpPr>
+        <p:cNvPr id="1" name=""/>
+        <p:cNvGrpSpPr/>
+        <p:nvPr/>
+      </p:nvGrpSpPr>
+      <p:grpSpPr>
+        <a:xfrm>
+          <a:off x="0" y="0"/>
+          <a:ext cx="0" cy="0"/>
+          <a:chOff x="0" y="0"/>
+          <a:chExt cx="0" cy="0"/>
+        </a:xfrm>
+      </p:grpSpPr>
+      <p:sp>
+        <p:nvSpPr>
+          <p:cNvPr id="199" name="Shape 199"/>
+          <p:cNvSpPr>
+            <a:spLocks noGrp="1"/>
+          </p:cNvSpPr>
+          <p:nvPr>
+            <p:ph type="title"/>
+          </p:nvPr>
+        </p:nvSpPr>
+        <p:spPr>
+          <a:xfrm>
+            <a:off x="406400" y="1536700"/>
+            <a:ext cx="12192000" cy="1169261"/>
+          </a:xfrm>
+          <a:prstGeom prst="rect">
+            <a:avLst/>
+          </a:prstGeom>
+        </p:spPr>
+        <p:txBody>
+          <a:bodyPr>
+            <a:normAutofit/>
+          </a:bodyPr>
+          <a:lstStyle>
+            <a:lvl1pPr defTabSz="403097">
+              <a:spcBef>
+                <a:spcPts val="1900"/>
+              </a:spcBef>
+              <a:defRPr sz="8200"/>
+            </a:lvl1pPr>
+          </a:lstStyle>
+          <a:p>
+            <a:r>
+              <a:t>Problems with Probability</a:t>
+            </a:r>
+          </a:p>
+        </p:txBody>
+      </p:sp>
+      <p:sp>
+        <p:nvSpPr>
+          <p:cNvPr id="200" name="Shape 200"/>
+          <p:cNvSpPr>
+            <a:spLocks noGrp="1"/>
+          </p:cNvSpPr>
+          <p:nvPr>
+            <p:ph type="body" sz="half" idx="1"/>
+          </p:nvPr>
+        </p:nvSpPr>
+        <p:spPr>
+          <a:xfrm>
+            <a:off x="406400" y="4538100"/>
+            <a:ext cx="12192000" cy="2531601"/>
+          </a:xfrm>
+          <a:prstGeom prst="rect">
+            <a:avLst/>
+          </a:prstGeom>
+        </p:spPr>
+        <p:txBody>
+          <a:bodyPr anchor="t"/>
+          <a:lstStyle/>
+          <a:p>
+            <a:pPr marL="550656" indent="-550656" defTabSz="455674">
+              <a:lnSpc>
+                <a:spcPct val="100000"/>
+              </a:lnSpc>
+              <a:spcBef>
+                <a:spcPts val="2100"/>
+              </a:spcBef>
+              <a:buSzPct val="40000"/>
+              <a:buBlip>
+                <a:blip r:embed="rId2"/>
+              </a:buBlip>
+              <a:defRPr sz="4900" cap="none" spc="0">
+                <a:latin typeface="Avenir Next Medium"/>
+                <a:ea typeface="Avenir Next Medium"/>
+                <a:cs typeface="Avenir Next Medium"/>
+                <a:sym typeface="Avenir Next Medium"/>
+              </a:defRPr>
+            </a:pPr>
+            <a:r>
+              <a:t>Positive values only</a:t>
+            </a:r>
+          </a:p>
+          <a:p>
+            <a:pPr marL="550656" indent="-550656" defTabSz="455674">
+              <a:lnSpc>
+                <a:spcPct val="100000"/>
+              </a:lnSpc>
+              <a:spcBef>
+                <a:spcPts val="2100"/>
+              </a:spcBef>
+              <a:buSzPct val="40000"/>
+              <a:buBlip>
+                <a:blip r:embed="rId2"/>
+              </a:buBlip>
+              <a:defRPr sz="4900" cap="none" spc="0">
+                <a:latin typeface="Avenir Next Medium"/>
+                <a:ea typeface="Avenir Next Medium"/>
+                <a:cs typeface="Avenir Next Medium"/>
+                <a:sym typeface="Avenir Next Medium"/>
+              </a:defRPr>
+            </a:pPr>
+            <a:r>
+              <a:t>Must fit between 0 and 1</a:t>
+            </a:r>
+          </a:p>
+        </p:txBody>
+      </p:sp>
+    </p:spTree>
+  </p:cSld>
+  <p:clrMapOvr>
+    <a:masterClrMapping/>
+  </p:clrMapOvr>
+  <p:transition spd="med"/>
+</p:sld>
+</file>
+
+<file path=ppt/slides/slide40.xml><?xml version="1.0" encoding="utf-8"?>
 <p:sld xmlns:a="http://schemas.openxmlformats.org/drawingml/2006/main" xmlns:r="http://schemas.openxmlformats.org/officeDocument/2006/relationships" xmlns:p="http://schemas.openxmlformats.org/presentationml/2006/main">
   <p:cSld>
     <p:spTree>
@@ -18458,141 +18990,7 @@
 </p:sld>
 </file>
 
-<file path=ppt/slides/slide4.xml><?xml version="1.0" encoding="utf-8"?>
-<p:sld xmlns:a="http://schemas.openxmlformats.org/drawingml/2006/main" xmlns:r="http://schemas.openxmlformats.org/officeDocument/2006/relationships" xmlns:p="http://schemas.openxmlformats.org/presentationml/2006/main">
-  <p:cSld>
-    <p:spTree>
-      <p:nvGrpSpPr>
-        <p:cNvPr id="1" name=""/>
-        <p:cNvGrpSpPr/>
-        <p:nvPr/>
-      </p:nvGrpSpPr>
-      <p:grpSpPr>
-        <a:xfrm>
-          <a:off x="0" y="0"/>
-          <a:ext cx="0" cy="0"/>
-          <a:chOff x="0" y="0"/>
-          <a:chExt cx="0" cy="0"/>
-        </a:xfrm>
-      </p:grpSpPr>
-      <p:sp>
-        <p:nvSpPr>
-          <p:cNvPr id="199" name="Shape 199"/>
-          <p:cNvSpPr>
-            <a:spLocks noGrp="1"/>
-          </p:cNvSpPr>
-          <p:nvPr>
-            <p:ph type="title"/>
-          </p:nvPr>
-        </p:nvSpPr>
-        <p:spPr>
-          <a:xfrm>
-            <a:off x="406400" y="1536700"/>
-            <a:ext cx="12192000" cy="1169261"/>
-          </a:xfrm>
-          <a:prstGeom prst="rect">
-            <a:avLst/>
-          </a:prstGeom>
-        </p:spPr>
-        <p:txBody>
-          <a:bodyPr>
-            <a:normAutofit fontScale="90000"/>
-          </a:bodyPr>
-          <a:lstStyle>
-            <a:lvl1pPr defTabSz="403097">
-              <a:spcBef>
-                <a:spcPts val="1900"/>
-              </a:spcBef>
-              <a:defRPr sz="8200"/>
-            </a:lvl1pPr>
-          </a:lstStyle>
-          <a:p>
-            <a:r>
-              <a:t>Problems with Probability</a:t>
-            </a:r>
-          </a:p>
-        </p:txBody>
-      </p:sp>
-      <p:sp>
-        <p:nvSpPr>
-          <p:cNvPr id="200" name="Shape 200"/>
-          <p:cNvSpPr>
-            <a:spLocks noGrp="1"/>
-          </p:cNvSpPr>
-          <p:nvPr>
-            <p:ph type="body" sz="half" idx="1"/>
-          </p:nvPr>
-        </p:nvSpPr>
-        <p:spPr>
-          <a:xfrm>
-            <a:off x="406400" y="4538100"/>
-            <a:ext cx="12192000" cy="2531601"/>
-          </a:xfrm>
-          <a:prstGeom prst="rect">
-            <a:avLst/>
-          </a:prstGeom>
-        </p:spPr>
-        <p:txBody>
-          <a:bodyPr anchor="t"/>
-          <a:lstStyle/>
-          <a:p>
-            <a:pPr marL="550656" indent="-550656" defTabSz="455674">
-              <a:lnSpc>
-                <a:spcPct val="100000"/>
-              </a:lnSpc>
-              <a:spcBef>
-                <a:spcPts val="2100"/>
-              </a:spcBef>
-              <a:buSzPct val="40000"/>
-              <a:buBlip>
-                <a:blip r:embed="rId2"/>
-              </a:buBlip>
-              <a:defRPr sz="4900" cap="none" spc="0">
-                <a:latin typeface="Avenir Next Medium"/>
-                <a:ea typeface="Avenir Next Medium"/>
-                <a:cs typeface="Avenir Next Medium"/>
-                <a:sym typeface="Avenir Next Medium"/>
-              </a:defRPr>
-            </a:pPr>
-            <a:r>
-              <a:t>Positive values only</a:t>
-            </a:r>
-          </a:p>
-          <a:p>
-            <a:pPr marL="550656" indent="-550656" defTabSz="455674">
-              <a:lnSpc>
-                <a:spcPct val="100000"/>
-              </a:lnSpc>
-              <a:spcBef>
-                <a:spcPts val="2100"/>
-              </a:spcBef>
-              <a:buSzPct val="40000"/>
-              <a:buBlip>
-                <a:blip r:embed="rId2"/>
-              </a:buBlip>
-              <a:defRPr sz="4900" cap="none" spc="0">
-                <a:latin typeface="Avenir Next Medium"/>
-                <a:ea typeface="Avenir Next Medium"/>
-                <a:cs typeface="Avenir Next Medium"/>
-                <a:sym typeface="Avenir Next Medium"/>
-              </a:defRPr>
-            </a:pPr>
-            <a:r>
-              <a:t>Must fit between 0 and 1</a:t>
-            </a:r>
-          </a:p>
-        </p:txBody>
-      </p:sp>
-    </p:spTree>
-  </p:cSld>
-  <p:clrMapOvr>
-    <a:masterClrMapping/>
-  </p:clrMapOvr>
-  <p:transition spd="med"/>
-</p:sld>
-</file>
-
-<file path=ppt/slides/slide40.xml><?xml version="1.0" encoding="utf-8"?>
+<file path=ppt/slides/slide41.xml><?xml version="1.0" encoding="utf-8"?>
 <p:sld xmlns:a="http://schemas.openxmlformats.org/drawingml/2006/main" xmlns:r="http://schemas.openxmlformats.org/officeDocument/2006/relationships" xmlns:p="http://schemas.openxmlformats.org/presentationml/2006/main">
   <p:cSld>
     <p:spTree>
@@ -18724,7 +19122,7 @@
 </p:sld>
 </file>
 
-<file path=ppt/slides/slide41.xml><?xml version="1.0" encoding="utf-8"?>
+<file path=ppt/slides/slide42.xml><?xml version="1.0" encoding="utf-8"?>
 <p:sld xmlns:a="http://schemas.openxmlformats.org/drawingml/2006/main" xmlns:r="http://schemas.openxmlformats.org/officeDocument/2006/relationships" xmlns:p="http://schemas.openxmlformats.org/presentationml/2006/main">
   <p:cSld>
     <p:spTree>
@@ -18778,7 +19176,7 @@
 </p:sld>
 </file>
 
-<file path=ppt/slides/slide42.xml><?xml version="1.0" encoding="utf-8"?>
+<file path=ppt/slides/slide43.xml><?xml version="1.0" encoding="utf-8"?>
 <p:sld xmlns:a="http://schemas.openxmlformats.org/drawingml/2006/main" xmlns:r="http://schemas.openxmlformats.org/officeDocument/2006/relationships" xmlns:p="http://schemas.openxmlformats.org/presentationml/2006/main">
   <p:cSld>
     <p:spTree>
@@ -18910,7 +19308,7 @@
 </p:sld>
 </file>
 
-<file path=ppt/slides/slide43.xml><?xml version="1.0" encoding="utf-8"?>
+<file path=ppt/slides/slide44.xml><?xml version="1.0" encoding="utf-8"?>
 <p:sld xmlns:a="http://schemas.openxmlformats.org/drawingml/2006/main" xmlns:r="http://schemas.openxmlformats.org/officeDocument/2006/relationships" xmlns:p="http://schemas.openxmlformats.org/presentationml/2006/main">
   <p:cSld>
     <p:spTree>
@@ -19042,7 +19440,7 @@
 </p:sld>
 </file>
 
-<file path=ppt/slides/slide44.xml><?xml version="1.0" encoding="utf-8"?>
+<file path=ppt/slides/slide45.xml><?xml version="1.0" encoding="utf-8"?>
 <p:sld xmlns:a="http://schemas.openxmlformats.org/drawingml/2006/main" xmlns:r="http://schemas.openxmlformats.org/officeDocument/2006/relationships" xmlns:p="http://schemas.openxmlformats.org/presentationml/2006/main">
   <p:cSld>
     <p:spTree>
@@ -19212,7 +19610,7 @@
         </p:spPr>
         <p:txBody>
           <a:bodyPr>
-            <a:normAutofit fontScale="90000"/>
+            <a:normAutofit/>
           </a:bodyPr>
           <a:lstStyle>
             <a:lvl1pPr defTabSz="391004">
@@ -19654,6 +20052,183 @@
       </p:sp>
       <p:sp>
         <p:nvSpPr>
+          <p:cNvPr id="6" name="TextBox 5">
+            <a:extLst>
+              <a:ext uri="{FF2B5EF4-FFF2-40B4-BE49-F238E27FC236}">
+                <a16:creationId xmlns:a16="http://schemas.microsoft.com/office/drawing/2014/main" id="{F389ACB2-67CB-9CEB-C761-8C2146E07C79}"/>
+              </a:ext>
+            </a:extLst>
+          </p:cNvPr>
+          <p:cNvSpPr txBox="1"/>
+          <p:nvPr/>
+        </p:nvSpPr>
+        <p:spPr>
+          <a:xfrm>
+            <a:off x="406400" y="3190910"/>
+            <a:ext cx="8447825" cy="948978"/>
+          </a:xfrm>
+          <a:prstGeom prst="rect">
+            <a:avLst/>
+          </a:prstGeom>
+          <a:noFill/>
+          <a:ln w="12700" cap="flat">
+            <a:noFill/>
+            <a:miter lim="400000"/>
+          </a:ln>
+          <a:effectLst/>
+          <a:sp3d/>
+        </p:spPr>
+        <p:style>
+          <a:lnRef idx="0">
+            <a:scrgbClr r="0" g="0" b="0"/>
+          </a:lnRef>
+          <a:fillRef idx="0">
+            <a:scrgbClr r="0" g="0" b="0"/>
+          </a:fillRef>
+          <a:effectRef idx="0">
+            <a:scrgbClr r="0" g="0" b="0"/>
+          </a:effectRef>
+          <a:fontRef idx="none"/>
+        </p:style>
+        <p:txBody>
+          <a:bodyPr rot="0" spcFirstLastPara="1" vertOverflow="overflow" horzOverflow="overflow" vert="horz" wrap="none" lIns="50800" tIns="50800" rIns="50800" bIns="50800" numCol="1" spcCol="38100" rtlCol="0" anchor="ctr">
+            <a:spAutoFit/>
+          </a:bodyPr>
+          <a:lstStyle/>
+          <a:p>
+            <a:pPr marL="0" marR="0" indent="0" algn="l" defTabSz="584200" rtl="0" fontAlgn="auto" latinLnBrk="0" hangingPunct="0">
+              <a:lnSpc>
+                <a:spcPct val="100000"/>
+              </a:lnSpc>
+              <a:spcBef>
+                <a:spcPts val="2400"/>
+              </a:spcBef>
+              <a:spcAft>
+                <a:spcPts val="0"/>
+              </a:spcAft>
+              <a:buClrTx/>
+              <a:buSzTx/>
+              <a:buFontTx/>
+              <a:buNone/>
+              <a:tabLst/>
+            </a:pPr>
+            <a:r>
+              <a:rPr kumimoji="0" lang="en-US" sz="3500" b="0" i="0" u="none" strike="noStrike" cap="none" spc="0" normalizeH="0" baseline="0" dirty="0">
+                <a:ln>
+                  <a:noFill/>
+                </a:ln>
+                <a:solidFill>
+                  <a:srgbClr val="222222"/>
+                </a:solidFill>
+                <a:effectLst/>
+                <a:uFillTx/>
+                <a:latin typeface="DIN Condensed"/>
+                <a:ea typeface="DIN Condensed"/>
+                <a:cs typeface="DIN Condensed"/>
+                <a:sym typeface="DIN Condensed"/>
+              </a:rPr>
+              <a:t>In the case where the probability of winning is at least 50%...</a:t>
+            </a:r>
+          </a:p>
+        </p:txBody>
+      </p:sp>
+      <p:sp>
+        <p:nvSpPr>
+          <p:cNvPr id="3" name="Text Placeholder 2">
+            <a:extLst>
+              <a:ext uri="{FF2B5EF4-FFF2-40B4-BE49-F238E27FC236}">
+                <a16:creationId xmlns:a16="http://schemas.microsoft.com/office/drawing/2014/main" id="{07F1C1F7-130D-09C6-F258-C631A127540C}"/>
+              </a:ext>
+            </a:extLst>
+          </p:cNvPr>
+          <p:cNvSpPr>
+            <a:spLocks noGrp="1"/>
+          </p:cNvSpPr>
+          <p:nvPr>
+            <p:ph type="body" sz="quarter" idx="1"/>
+          </p:nvPr>
+        </p:nvSpPr>
+        <p:spPr/>
+        <p:txBody>
+          <a:bodyPr/>
+          <a:lstStyle/>
+          <a:p>
+            <a:r>
+              <a:rPr lang="en-US" dirty="0"/>
+              <a:t>Range from 0 to infinity</a:t>
+            </a:r>
+          </a:p>
+        </p:txBody>
+      </p:sp>
+    </p:spTree>
+    <p:extLst>
+      <p:ext uri="{BB962C8B-B14F-4D97-AF65-F5344CB8AC3E}">
+        <p14:creationId xmlns:p14="http://schemas.microsoft.com/office/powerpoint/2010/main" val="537788539"/>
+      </p:ext>
+    </p:extLst>
+  </p:cSld>
+  <p:clrMapOvr>
+    <a:masterClrMapping/>
+  </p:clrMapOvr>
+  <p:transition spd="med"/>
+</p:sld>
+</file>
+
+<file path=ppt/slides/slide9.xml><?xml version="1.0" encoding="utf-8"?>
+<p:sld xmlns:a="http://schemas.openxmlformats.org/drawingml/2006/main" xmlns:r="http://schemas.openxmlformats.org/officeDocument/2006/relationships" xmlns:p="http://schemas.openxmlformats.org/presentationml/2006/main">
+  <p:cSld>
+    <p:spTree>
+      <p:nvGrpSpPr>
+        <p:cNvPr id="1" name=""/>
+        <p:cNvGrpSpPr/>
+        <p:nvPr/>
+      </p:nvGrpSpPr>
+      <p:grpSpPr>
+        <a:xfrm>
+          <a:off x="0" y="0"/>
+          <a:ext cx="0" cy="0"/>
+          <a:chOff x="0" y="0"/>
+          <a:chExt cx="0" cy="0"/>
+        </a:xfrm>
+      </p:grpSpPr>
+      <p:sp>
+        <p:nvSpPr>
+          <p:cNvPr id="211" name="Shape 211"/>
+          <p:cNvSpPr>
+            <a:spLocks noGrp="1"/>
+          </p:cNvSpPr>
+          <p:nvPr>
+            <p:ph type="ctrTitle"/>
+          </p:nvPr>
+        </p:nvSpPr>
+        <p:spPr>
+          <a:xfrm>
+            <a:off x="406400" y="1536700"/>
+            <a:ext cx="12192000" cy="1169261"/>
+          </a:xfrm>
+          <a:prstGeom prst="rect">
+            <a:avLst/>
+          </a:prstGeom>
+        </p:spPr>
+        <p:txBody>
+          <a:bodyPr/>
+          <a:lstStyle>
+            <a:lvl1pPr defTabSz="403097">
+              <a:spcBef>
+                <a:spcPts val="1900"/>
+              </a:spcBef>
+              <a:defRPr sz="8200"/>
+            </a:lvl1pPr>
+          </a:lstStyle>
+          <a:p>
+            <a:r>
+              <a:t>Odds</a:t>
+            </a:r>
+          </a:p>
+        </p:txBody>
+      </p:sp>
+      <p:sp>
+        <p:nvSpPr>
           <p:cNvPr id="212" name="Shape 212"/>
           <p:cNvSpPr>
             <a:spLocks noGrp="1"/>
@@ -19730,146 +20305,88 @@
           </a:ln>
         </p:spPr>
       </p:pic>
-    </p:spTree>
-  </p:cSld>
-  <p:clrMapOvr>
-    <a:masterClrMapping/>
-  </p:clrMapOvr>
-  <p:transition spd="med"/>
-</p:sld>
-</file>
-
-<file path=ppt/slides/slide9.xml><?xml version="1.0" encoding="utf-8"?>
-<p:sld xmlns:a="http://schemas.openxmlformats.org/drawingml/2006/main" xmlns:r="http://schemas.openxmlformats.org/officeDocument/2006/relationships" xmlns:p="http://schemas.openxmlformats.org/presentationml/2006/main">
-  <p:cSld>
-    <p:spTree>
-      <p:nvGrpSpPr>
-        <p:cNvPr id="1" name=""/>
-        <p:cNvGrpSpPr/>
-        <p:nvPr/>
-      </p:nvGrpSpPr>
-      <p:grpSpPr>
-        <a:xfrm>
-          <a:off x="0" y="0"/>
-          <a:ext cx="0" cy="0"/>
-          <a:chOff x="0" y="0"/>
-          <a:chExt cx="0" cy="0"/>
-        </a:xfrm>
-      </p:grpSpPr>
       <p:sp>
         <p:nvSpPr>
-          <p:cNvPr id="215" name="Shape 215"/>
-          <p:cNvSpPr>
-            <a:spLocks noGrp="1"/>
-          </p:cNvSpPr>
-          <p:nvPr>
-            <p:ph type="ctrTitle"/>
-          </p:nvPr>
+          <p:cNvPr id="6" name="TextBox 5">
+            <a:extLst>
+              <a:ext uri="{FF2B5EF4-FFF2-40B4-BE49-F238E27FC236}">
+                <a16:creationId xmlns:a16="http://schemas.microsoft.com/office/drawing/2014/main" id="{F389ACB2-67CB-9CEB-C761-8C2146E07C79}"/>
+              </a:ext>
+            </a:extLst>
+          </p:cNvPr>
+          <p:cNvSpPr txBox="1"/>
+          <p:nvPr/>
         </p:nvSpPr>
         <p:spPr>
           <a:xfrm>
-            <a:off x="406400" y="1536700"/>
-            <a:ext cx="12192000" cy="1169261"/>
+            <a:off x="406400" y="3190910"/>
+            <a:ext cx="8447825" cy="948978"/>
           </a:xfrm>
           <a:prstGeom prst="rect">
             <a:avLst/>
           </a:prstGeom>
+          <a:noFill/>
+          <a:ln w="12700" cap="flat">
+            <a:noFill/>
+            <a:miter lim="400000"/>
+          </a:ln>
+          <a:effectLst/>
+          <a:sp3d/>
         </p:spPr>
+        <p:style>
+          <a:lnRef idx="0">
+            <a:scrgbClr r="0" g="0" b="0"/>
+          </a:lnRef>
+          <a:fillRef idx="0">
+            <a:scrgbClr r="0" g="0" b="0"/>
+          </a:fillRef>
+          <a:effectRef idx="0">
+            <a:scrgbClr r="0" g="0" b="0"/>
+          </a:effectRef>
+          <a:fontRef idx="none"/>
+        </p:style>
         <p:txBody>
-          <a:bodyPr/>
-          <a:lstStyle>
-            <a:lvl1pPr defTabSz="403097">
-              <a:spcBef>
-                <a:spcPts val="1900"/>
-              </a:spcBef>
-              <a:defRPr sz="8200"/>
-            </a:lvl1pPr>
-          </a:lstStyle>
-          <a:p>
-            <a:r>
-              <a:t>Odds</a:t>
+          <a:bodyPr rot="0" spcFirstLastPara="1" vertOverflow="overflow" horzOverflow="overflow" vert="horz" wrap="none" lIns="50800" tIns="50800" rIns="50800" bIns="50800" numCol="1" spcCol="38100" rtlCol="0" anchor="ctr">
+            <a:spAutoFit/>
+          </a:bodyPr>
+          <a:lstStyle/>
+          <a:p>
+            <a:pPr marL="0" marR="0" indent="0" algn="l" defTabSz="584200" rtl="0" fontAlgn="auto" latinLnBrk="0" hangingPunct="0">
+              <a:lnSpc>
+                <a:spcPct val="100000"/>
+              </a:lnSpc>
+              <a:spcBef>
+                <a:spcPts val="2400"/>
+              </a:spcBef>
+              <a:spcAft>
+                <a:spcPts val="0"/>
+              </a:spcAft>
+              <a:buClrTx/>
+              <a:buSzTx/>
+              <a:buFontTx/>
+              <a:buNone/>
+              <a:tabLst/>
+            </a:pPr>
+            <a:r>
+              <a:rPr kumimoji="0" lang="en-US" sz="3500" b="0" i="0" u="none" strike="noStrike" cap="none" spc="0" normalizeH="0" baseline="0" dirty="0">
+                <a:ln>
+                  <a:noFill/>
+                </a:ln>
+                <a:solidFill>
+                  <a:srgbClr val="222222"/>
+                </a:solidFill>
+                <a:effectLst/>
+                <a:uFillTx/>
+                <a:latin typeface="DIN Condensed"/>
+                <a:ea typeface="DIN Condensed"/>
+                <a:cs typeface="DIN Condensed"/>
+                <a:sym typeface="DIN Condensed"/>
+              </a:rPr>
+              <a:t>In the case where the probability of winning is at least 50%...</a:t>
             </a:r>
           </a:p>
         </p:txBody>
       </p:sp>
-      <p:sp>
-        <p:nvSpPr>
-          <p:cNvPr id="216" name="Shape 216"/>
-          <p:cNvSpPr>
-            <a:spLocks noGrp="1"/>
-          </p:cNvSpPr>
-          <p:nvPr>
-            <p:ph type="subTitle" sz="quarter" idx="1"/>
-          </p:nvPr>
-        </p:nvSpPr>
-        <p:spPr>
-          <a:xfrm>
-            <a:off x="0" y="3557918"/>
-            <a:ext cx="12192000" cy="1304860"/>
-          </a:xfrm>
-          <a:prstGeom prst="rect">
-            <a:avLst/>
-          </a:prstGeom>
-        </p:spPr>
-        <p:txBody>
-          <a:bodyPr anchor="t"/>
-          <a:lstStyle>
-            <a:lvl1pPr marL="550656" indent="-550656" defTabSz="455674">
-              <a:lnSpc>
-                <a:spcPct val="100000"/>
-              </a:lnSpc>
-              <a:spcBef>
-                <a:spcPts val="2100"/>
-              </a:spcBef>
-              <a:buSzPct val="40000"/>
-              <a:buBlip>
-                <a:blip r:embed="rId2"/>
-              </a:buBlip>
-              <a:defRPr sz="4900" cap="none">
-                <a:solidFill>
-                  <a:srgbClr val="838787"/>
-                </a:solidFill>
-                <a:latin typeface="Avenir Next Medium"/>
-                <a:ea typeface="Avenir Next Medium"/>
-                <a:cs typeface="Avenir Next Medium"/>
-                <a:sym typeface="Avenir Next Medium"/>
-              </a:defRPr>
-            </a:lvl1pPr>
-          </a:lstStyle>
-          <a:p>
-            <a:r>
-              <a:t>Only valid between 0 and 1</a:t>
-            </a:r>
-          </a:p>
-        </p:txBody>
-      </p:sp>
-      <p:pic>
-        <p:nvPicPr>
-          <p:cNvPr id="217" name="Screen Shot 2019-09-17 at 12.15.05 AM.png"/>
-          <p:cNvPicPr>
-            <a:picLocks noChangeAspect="1"/>
-          </p:cNvPicPr>
-          <p:nvPr/>
-        </p:nvPicPr>
-        <p:blipFill>
-          <a:blip r:embed="rId3"/>
-          <a:stretch>
-            <a:fillRect/>
-          </a:stretch>
-        </p:blipFill>
-        <p:spPr>
-          <a:xfrm>
-            <a:off x="-1" y="3133711"/>
-            <a:ext cx="13004801" cy="4968241"/>
-          </a:xfrm>
-          <a:prstGeom prst="rect">
-            <a:avLst/>
-          </a:prstGeom>
-          <a:ln w="12700">
-            <a:miter lim="400000"/>
-          </a:ln>
-        </p:spPr>
-      </p:pic>
     </p:spTree>
   </p:cSld>
   <p:clrMapOvr>

</xml_diff>

<commit_message>
made some changes to logistic regression stuff
</commit_message>
<xml_diff>
--- a/Session4/Session4_Slides.pptx
+++ b/Session4/Session4_Slides.pptx
@@ -644,7 +644,7 @@
                 <a:effectLst/>
                 <a:latin typeface="Arial" panose="020B0604020202020204" pitchFamily="34" charset="0"/>
               </a:rPr>
-              <a:t>	-Out of all the true positives, what proportion did you correctly identify?</a:t>
+              <a:t>	-Out of all the positive samples, what proportion did you *correctly* identify?</a:t>
             </a:r>
           </a:p>
           <a:p>
@@ -702,7 +702,120 @@
                 <a:effectLst/>
                 <a:latin typeface="Arial" panose="020B0604020202020204" pitchFamily="34" charset="0"/>
               </a:rPr>
-              <a:t>	-Out of all the true negatives, what proportion did we fail to identify as such?</a:t>
+              <a:t>	-Out of all the negative samples, what proportion did we *fail* to identify as such?</a:t>
+            </a:r>
+          </a:p>
+          <a:p>
+            <a:pPr marL="0" marR="0" lvl="0" indent="0" defTabSz="457200" eaLnBrk="1" fontAlgn="auto" latinLnBrk="0" hangingPunct="1">
+              <a:lnSpc>
+                <a:spcPct val="117999"/>
+              </a:lnSpc>
+              <a:spcBef>
+                <a:spcPts val="0"/>
+              </a:spcBef>
+              <a:spcAft>
+                <a:spcPts val="0"/>
+              </a:spcAft>
+              <a:buClrTx/>
+              <a:buSzTx/>
+              <a:buFontTx/>
+              <a:buNone/>
+              <a:tabLst/>
+              <a:defRPr/>
+            </a:pPr>
+            <a:r>
+              <a:rPr lang="en-US" b="0" i="0" dirty="0">
+                <a:solidFill>
+                  <a:srgbClr val="202122"/>
+                </a:solidFill>
+                <a:effectLst/>
+                <a:latin typeface="Arial" panose="020B0604020202020204" pitchFamily="34" charset="0"/>
+              </a:rPr>
+              <a:t>	(Specificity is like a recall but for the negative class; what portion of the negative class did we catch / capture?)</a:t>
+            </a:r>
+          </a:p>
+          <a:p>
+            <a:pPr marL="0" marR="0" lvl="0" indent="0" defTabSz="457200" eaLnBrk="1" fontAlgn="auto" latinLnBrk="0" hangingPunct="1">
+              <a:lnSpc>
+                <a:spcPct val="117999"/>
+              </a:lnSpc>
+              <a:spcBef>
+                <a:spcPts val="0"/>
+              </a:spcBef>
+              <a:spcAft>
+                <a:spcPts val="0"/>
+              </a:spcAft>
+              <a:buClrTx/>
+              <a:buSzTx/>
+              <a:buFontTx/>
+              <a:buNone/>
+              <a:tabLst/>
+              <a:defRPr/>
+            </a:pPr>
+            <a:endParaRPr lang="en-US" b="0" i="0" dirty="0">
+              <a:solidFill>
+                <a:srgbClr val="202122"/>
+              </a:solidFill>
+              <a:effectLst/>
+              <a:latin typeface="Arial" panose="020B0604020202020204" pitchFamily="34" charset="0"/>
+            </a:endParaRPr>
+          </a:p>
+          <a:p>
+            <a:pPr marL="0" marR="0" lvl="0" indent="0" defTabSz="457200" eaLnBrk="1" fontAlgn="auto" latinLnBrk="0" hangingPunct="1">
+              <a:lnSpc>
+                <a:spcPct val="117999"/>
+              </a:lnSpc>
+              <a:spcBef>
+                <a:spcPts val="0"/>
+              </a:spcBef>
+              <a:spcAft>
+                <a:spcPts val="0"/>
+              </a:spcAft>
+              <a:buClrTx/>
+              <a:buSzTx/>
+              <a:buFontTx/>
+              <a:buNone/>
+              <a:tabLst/>
+              <a:defRPr/>
+            </a:pPr>
+            <a:r>
+              <a:rPr lang="en-US" b="0" i="0" dirty="0">
+                <a:solidFill>
+                  <a:srgbClr val="202122"/>
+                </a:solidFill>
+                <a:effectLst/>
+                <a:latin typeface="Arial" panose="020B0604020202020204" pitchFamily="34" charset="0"/>
+              </a:rPr>
+              <a:t>The y axis is a success rate.</a:t>
+            </a:r>
+          </a:p>
+          <a:p>
+            <a:pPr marL="0" marR="0" lvl="0" indent="0" defTabSz="457200" eaLnBrk="1" fontAlgn="auto" latinLnBrk="0" hangingPunct="1">
+              <a:lnSpc>
+                <a:spcPct val="117999"/>
+              </a:lnSpc>
+              <a:spcBef>
+                <a:spcPts val="0"/>
+              </a:spcBef>
+              <a:spcAft>
+                <a:spcPts val="0"/>
+              </a:spcAft>
+              <a:buClrTx/>
+              <a:buSzTx/>
+              <a:buFontTx/>
+              <a:buNone/>
+              <a:tabLst/>
+              <a:defRPr/>
+            </a:pPr>
+            <a:r>
+              <a:rPr lang="en-US" b="0" i="0" dirty="0">
+                <a:solidFill>
+                  <a:srgbClr val="202122"/>
+                </a:solidFill>
+                <a:effectLst/>
+                <a:latin typeface="Arial" panose="020B0604020202020204" pitchFamily="34" charset="0"/>
+              </a:rPr>
+              <a:t>The x axis is a failure rate.</a:t>
             </a:r>
             <a:endParaRPr lang="en-US" dirty="0"/>
           </a:p>
@@ -819,7 +932,7 @@
                 <a:effectLst/>
                 <a:latin typeface="Arial" panose="020B0604020202020204" pitchFamily="34" charset="0"/>
               </a:rPr>
-              <a:t>	-Out of all the true positives, what proportion did you correctly identify?</a:t>
+              <a:t>	-Out of all the positive samples, what proportion did you *correctly* identify?</a:t>
             </a:r>
           </a:p>
           <a:p>
@@ -877,7 +990,120 @@
                 <a:effectLst/>
                 <a:latin typeface="Arial" panose="020B0604020202020204" pitchFamily="34" charset="0"/>
               </a:rPr>
-              <a:t>	-Out of all the true negatives, what proportion did we fail to identify as such?</a:t>
+              <a:t>	-Out of all the negative samples, what proportion did we *fail* to identify as such?</a:t>
+            </a:r>
+          </a:p>
+          <a:p>
+            <a:pPr marL="0" marR="0" lvl="0" indent="0" defTabSz="457200" eaLnBrk="1" fontAlgn="auto" latinLnBrk="0" hangingPunct="1">
+              <a:lnSpc>
+                <a:spcPct val="117999"/>
+              </a:lnSpc>
+              <a:spcBef>
+                <a:spcPts val="0"/>
+              </a:spcBef>
+              <a:spcAft>
+                <a:spcPts val="0"/>
+              </a:spcAft>
+              <a:buClrTx/>
+              <a:buSzTx/>
+              <a:buFontTx/>
+              <a:buNone/>
+              <a:tabLst/>
+              <a:defRPr/>
+            </a:pPr>
+            <a:r>
+              <a:rPr lang="en-US" b="0" i="0" dirty="0">
+                <a:solidFill>
+                  <a:srgbClr val="202122"/>
+                </a:solidFill>
+                <a:effectLst/>
+                <a:latin typeface="Arial" panose="020B0604020202020204" pitchFamily="34" charset="0"/>
+              </a:rPr>
+              <a:t>	(Specificity is like a recall but for the negative class; what portion of the negative class did we catch / capture?)</a:t>
+            </a:r>
+          </a:p>
+          <a:p>
+            <a:pPr marL="0" marR="0" lvl="0" indent="0" defTabSz="457200" eaLnBrk="1" fontAlgn="auto" latinLnBrk="0" hangingPunct="1">
+              <a:lnSpc>
+                <a:spcPct val="117999"/>
+              </a:lnSpc>
+              <a:spcBef>
+                <a:spcPts val="0"/>
+              </a:spcBef>
+              <a:spcAft>
+                <a:spcPts val="0"/>
+              </a:spcAft>
+              <a:buClrTx/>
+              <a:buSzTx/>
+              <a:buFontTx/>
+              <a:buNone/>
+              <a:tabLst/>
+              <a:defRPr/>
+            </a:pPr>
+            <a:endParaRPr lang="en-US" b="0" i="0" dirty="0">
+              <a:solidFill>
+                <a:srgbClr val="202122"/>
+              </a:solidFill>
+              <a:effectLst/>
+              <a:latin typeface="Arial" panose="020B0604020202020204" pitchFamily="34" charset="0"/>
+            </a:endParaRPr>
+          </a:p>
+          <a:p>
+            <a:pPr marL="0" marR="0" lvl="0" indent="0" defTabSz="457200" eaLnBrk="1" fontAlgn="auto" latinLnBrk="0" hangingPunct="1">
+              <a:lnSpc>
+                <a:spcPct val="117999"/>
+              </a:lnSpc>
+              <a:spcBef>
+                <a:spcPts val="0"/>
+              </a:spcBef>
+              <a:spcAft>
+                <a:spcPts val="0"/>
+              </a:spcAft>
+              <a:buClrTx/>
+              <a:buSzTx/>
+              <a:buFontTx/>
+              <a:buNone/>
+              <a:tabLst/>
+              <a:defRPr/>
+            </a:pPr>
+            <a:r>
+              <a:rPr lang="en-US" b="0" i="0" dirty="0">
+                <a:solidFill>
+                  <a:srgbClr val="202122"/>
+                </a:solidFill>
+                <a:effectLst/>
+                <a:latin typeface="Arial" panose="020B0604020202020204" pitchFamily="34" charset="0"/>
+              </a:rPr>
+              <a:t>The y axis is a success rate.</a:t>
+            </a:r>
+          </a:p>
+          <a:p>
+            <a:pPr marL="0" marR="0" lvl="0" indent="0" defTabSz="457200" eaLnBrk="1" fontAlgn="auto" latinLnBrk="0" hangingPunct="1">
+              <a:lnSpc>
+                <a:spcPct val="117999"/>
+              </a:lnSpc>
+              <a:spcBef>
+                <a:spcPts val="0"/>
+              </a:spcBef>
+              <a:spcAft>
+                <a:spcPts val="0"/>
+              </a:spcAft>
+              <a:buClrTx/>
+              <a:buSzTx/>
+              <a:buFontTx/>
+              <a:buNone/>
+              <a:tabLst/>
+              <a:defRPr/>
+            </a:pPr>
+            <a:r>
+              <a:rPr lang="en-US" b="0" i="0" dirty="0">
+                <a:solidFill>
+                  <a:srgbClr val="202122"/>
+                </a:solidFill>
+                <a:effectLst/>
+                <a:latin typeface="Arial" panose="020B0604020202020204" pitchFamily="34" charset="0"/>
+              </a:rPr>
+              <a:t>The x axis is a failure rate.</a:t>
             </a:r>
             <a:endParaRPr lang="en-US" dirty="0"/>
           </a:p>
@@ -994,7 +1220,7 @@
                 <a:effectLst/>
                 <a:latin typeface="Arial" panose="020B0604020202020204" pitchFamily="34" charset="0"/>
               </a:rPr>
-              <a:t>	-Out of all the true positives, what proportion did you correctly identify?</a:t>
+              <a:t>	-Out of all the positive samples, what proportion did you *correctly* identify?</a:t>
             </a:r>
           </a:p>
           <a:p>
@@ -1052,7 +1278,120 @@
                 <a:effectLst/>
                 <a:latin typeface="Arial" panose="020B0604020202020204" pitchFamily="34" charset="0"/>
               </a:rPr>
-              <a:t>	-Out of all the true negatives, what proportion did we fail to identify as such?</a:t>
+              <a:t>	-Out of all the negative samples, what proportion did we *fail* to identify as such?</a:t>
+            </a:r>
+          </a:p>
+          <a:p>
+            <a:pPr marL="0" marR="0" lvl="0" indent="0" defTabSz="457200" eaLnBrk="1" fontAlgn="auto" latinLnBrk="0" hangingPunct="1">
+              <a:lnSpc>
+                <a:spcPct val="117999"/>
+              </a:lnSpc>
+              <a:spcBef>
+                <a:spcPts val="0"/>
+              </a:spcBef>
+              <a:spcAft>
+                <a:spcPts val="0"/>
+              </a:spcAft>
+              <a:buClrTx/>
+              <a:buSzTx/>
+              <a:buFontTx/>
+              <a:buNone/>
+              <a:tabLst/>
+              <a:defRPr/>
+            </a:pPr>
+            <a:r>
+              <a:rPr lang="en-US" b="0" i="0" dirty="0">
+                <a:solidFill>
+                  <a:srgbClr val="202122"/>
+                </a:solidFill>
+                <a:effectLst/>
+                <a:latin typeface="Arial" panose="020B0604020202020204" pitchFamily="34" charset="0"/>
+              </a:rPr>
+              <a:t>	(Specificity is like a recall but for the negative class; what portion of the negative class did we catch / capture?)</a:t>
+            </a:r>
+          </a:p>
+          <a:p>
+            <a:pPr marL="0" marR="0" lvl="0" indent="0" defTabSz="457200" eaLnBrk="1" fontAlgn="auto" latinLnBrk="0" hangingPunct="1">
+              <a:lnSpc>
+                <a:spcPct val="117999"/>
+              </a:lnSpc>
+              <a:spcBef>
+                <a:spcPts val="0"/>
+              </a:spcBef>
+              <a:spcAft>
+                <a:spcPts val="0"/>
+              </a:spcAft>
+              <a:buClrTx/>
+              <a:buSzTx/>
+              <a:buFontTx/>
+              <a:buNone/>
+              <a:tabLst/>
+              <a:defRPr/>
+            </a:pPr>
+            <a:endParaRPr lang="en-US" b="0" i="0" dirty="0">
+              <a:solidFill>
+                <a:srgbClr val="202122"/>
+              </a:solidFill>
+              <a:effectLst/>
+              <a:latin typeface="Arial" panose="020B0604020202020204" pitchFamily="34" charset="0"/>
+            </a:endParaRPr>
+          </a:p>
+          <a:p>
+            <a:pPr marL="0" marR="0" lvl="0" indent="0" defTabSz="457200" eaLnBrk="1" fontAlgn="auto" latinLnBrk="0" hangingPunct="1">
+              <a:lnSpc>
+                <a:spcPct val="117999"/>
+              </a:lnSpc>
+              <a:spcBef>
+                <a:spcPts val="0"/>
+              </a:spcBef>
+              <a:spcAft>
+                <a:spcPts val="0"/>
+              </a:spcAft>
+              <a:buClrTx/>
+              <a:buSzTx/>
+              <a:buFontTx/>
+              <a:buNone/>
+              <a:tabLst/>
+              <a:defRPr/>
+            </a:pPr>
+            <a:r>
+              <a:rPr lang="en-US" b="0" i="0" dirty="0">
+                <a:solidFill>
+                  <a:srgbClr val="202122"/>
+                </a:solidFill>
+                <a:effectLst/>
+                <a:latin typeface="Arial" panose="020B0604020202020204" pitchFamily="34" charset="0"/>
+              </a:rPr>
+              <a:t>The y axis is a success rate.</a:t>
+            </a:r>
+          </a:p>
+          <a:p>
+            <a:pPr marL="0" marR="0" lvl="0" indent="0" defTabSz="457200" eaLnBrk="1" fontAlgn="auto" latinLnBrk="0" hangingPunct="1">
+              <a:lnSpc>
+                <a:spcPct val="117999"/>
+              </a:lnSpc>
+              <a:spcBef>
+                <a:spcPts val="0"/>
+              </a:spcBef>
+              <a:spcAft>
+                <a:spcPts val="0"/>
+              </a:spcAft>
+              <a:buClrTx/>
+              <a:buSzTx/>
+              <a:buFontTx/>
+              <a:buNone/>
+              <a:tabLst/>
+              <a:defRPr/>
+            </a:pPr>
+            <a:r>
+              <a:rPr lang="en-US" b="0" i="0" dirty="0">
+                <a:solidFill>
+                  <a:srgbClr val="202122"/>
+                </a:solidFill>
+                <a:effectLst/>
+                <a:latin typeface="Arial" panose="020B0604020202020204" pitchFamily="34" charset="0"/>
+              </a:rPr>
+              <a:t>The x axis is a failure rate.</a:t>
             </a:r>
             <a:endParaRPr lang="en-US" dirty="0"/>
           </a:p>
@@ -1164,7 +1503,7 @@
                 <a:effectLst/>
                 <a:latin typeface="Arial" panose="020B0604020202020204" pitchFamily="34" charset="0"/>
               </a:rPr>
-              <a:t>	-Out of all the true positives, what proportion did you correctly identify?</a:t>
+              <a:t>	-Out of all the positive samples, what proportion did you correctly identify?</a:t>
             </a:r>
           </a:p>
         </p:txBody>
@@ -13965,7 +14304,7 @@
           </a:ln>
           <a:extLst>
             <a:ext uri="{C572A759-6A51-4108-AA02-DFA0A04FC94B}">
-              <ma14:wrappingTextBoxFlag xmlns="" xmlns:ma14="http://schemas.microsoft.com/office/mac/drawingml/2011/main" val="1"/>
+              <ma14:wrappingTextBoxFlag xmlns:ma14="http://schemas.microsoft.com/office/mac/drawingml/2011/main" xmlns="" val="1"/>
             </a:ext>
           </a:extLst>
         </p:spPr>
@@ -14004,7 +14343,7 @@
           </a:ln>
           <a:extLst>
             <a:ext uri="{C572A759-6A51-4108-AA02-DFA0A04FC94B}">
-              <ma14:wrappingTextBoxFlag xmlns="" xmlns:ma14="http://schemas.microsoft.com/office/mac/drawingml/2011/main" val="1"/>
+              <ma14:wrappingTextBoxFlag xmlns:ma14="http://schemas.microsoft.com/office/mac/drawingml/2011/main" xmlns="" val="1"/>
             </a:ext>
           </a:extLst>
         </p:spPr>
@@ -15279,8 +15618,8 @@
           </a:p>
         </p:txBody>
       </p:sp>
-      <mc:AlternateContent xmlns:mc="http://schemas.openxmlformats.org/markup-compatibility/2006">
-        <mc:Choice xmlns:a14="http://schemas.microsoft.com/office/drawing/2010/main" Requires="a14">
+      <mc:AlternateContent xmlns:mc="http://schemas.openxmlformats.org/markup-compatibility/2006" xmlns:a14="http://schemas.microsoft.com/office/drawing/2010/main">
+        <mc:Choice Requires="a14">
           <p:sp>
             <p:nvSpPr>
               <p:cNvPr id="220" name="Shape 220"/>
@@ -15457,7 +15796,7 @@
             </p:txBody>
           </p:sp>
         </mc:Choice>
-        <mc:Fallback>
+        <mc:Fallback xmlns="">
           <p:sp>
             <p:nvSpPr>
               <p:cNvPr id="220" name="Shape 220"/>
@@ -15732,7 +16071,7 @@
           </a:ln>
           <a:extLst>
             <a:ext uri="{C572A759-6A51-4108-AA02-DFA0A04FC94B}">
-              <ma14:wrappingTextBoxFlag xmlns="" xmlns:ma14="http://schemas.microsoft.com/office/mac/drawingml/2011/main" val="1"/>
+              <ma14:wrappingTextBoxFlag xmlns:ma14="http://schemas.microsoft.com/office/mac/drawingml/2011/main" xmlns="" val="1"/>
             </a:ext>
           </a:extLst>
         </p:spPr>
@@ -17477,7 +17816,7 @@
               </a:buBlip>
               <a:defRPr sz="6400"/>
             </a:pPr>
-            <a:endParaRPr/>
+            <a:endParaRPr dirty="0"/>
           </a:p>
           <a:p>
             <a:pPr marL="705970" indent="-705970">
@@ -17490,7 +17829,16 @@
               <a:defRPr sz="6400"/>
             </a:pPr>
             <a:r>
-              <a:t>X-axis is sized relative to POSITIVE class</a:t>
+              <a:rPr dirty="0"/>
+              <a:t>X-axis is sized relative to </a:t>
+            </a:r>
+            <a:r>
+              <a:rPr lang="en-US" dirty="0"/>
+              <a:t>NEGATIVE</a:t>
+            </a:r>
+            <a:r>
+              <a:rPr dirty="0"/>
+              <a:t> class</a:t>
             </a:r>
           </a:p>
           <a:p>
@@ -17504,7 +17852,16 @@
               <a:defRPr sz="6400"/>
             </a:pPr>
             <a:r>
-              <a:t>Y-axis is sized relative to NEGATIVE class</a:t>
+              <a:rPr dirty="0"/>
+              <a:t>Y-axis is sized relative to </a:t>
+            </a:r>
+            <a:r>
+              <a:rPr lang="en-US" dirty="0"/>
+              <a:t>POSITIVE</a:t>
+            </a:r>
+            <a:r>
+              <a:rPr dirty="0"/>
+              <a:t> class</a:t>
             </a:r>
           </a:p>
         </p:txBody>
@@ -17912,7 +18269,7 @@
           </a:ln>
           <a:extLst>
             <a:ext uri="{C572A759-6A51-4108-AA02-DFA0A04FC94B}">
-              <ma14:wrappingTextBoxFlag xmlns="" xmlns:ma14="http://schemas.microsoft.com/office/mac/drawingml/2011/main" val="1"/>
+              <ma14:wrappingTextBoxFlag xmlns:ma14="http://schemas.microsoft.com/office/mac/drawingml/2011/main" xmlns="" val="1"/>
             </a:ext>
           </a:extLst>
         </p:spPr>
@@ -17955,7 +18312,7 @@
           </a:ln>
           <a:extLst>
             <a:ext uri="{C572A759-6A51-4108-AA02-DFA0A04FC94B}">
-              <ma14:wrappingTextBoxFlag xmlns="" xmlns:ma14="http://schemas.microsoft.com/office/mac/drawingml/2011/main" val="1"/>
+              <ma14:wrappingTextBoxFlag xmlns:ma14="http://schemas.microsoft.com/office/mac/drawingml/2011/main" xmlns="" val="1"/>
             </a:ext>
           </a:extLst>
         </p:spPr>

</xml_diff>